<commit_message>
Design paper - related work and introduction
</commit_message>
<xml_diff>
--- a/wip-design/figures/thegamma.pptx
+++ b/wip-design/figures/thegamma.pptx
@@ -6,8 +6,9 @@
   </p:sldMasterIdLst>
   <p:sldIdLst>
     <p:sldId id="256" r:id="rId2"/>
-    <p:sldId id="257" r:id="rId3"/>
-    <p:sldId id="258" r:id="rId4"/>
+    <p:sldId id="259" r:id="rId3"/>
+    <p:sldId id="257" r:id="rId4"/>
+    <p:sldId id="258" r:id="rId5"/>
   </p:sldIdLst>
   <p:sldSz cx="12192000" cy="6858000"/>
   <p:notesSz cx="6858000" cy="9144000"/>
@@ -261,7 +262,7 @@
           <a:p>
             <a:fld id="{001A219B-7441-422C-8DCF-B69CF4F9A207}" type="datetimeFigureOut">
               <a:rPr lang="en-US" smtClean="0"/>
-              <a:t>3/22/2020</a:t>
+              <a:t>9/10/2020</a:t>
             </a:fld>
             <a:endParaRPr lang="en-US"/>
           </a:p>
@@ -459,7 +460,7 @@
           <a:p>
             <a:fld id="{001A219B-7441-422C-8DCF-B69CF4F9A207}" type="datetimeFigureOut">
               <a:rPr lang="en-US" smtClean="0"/>
-              <a:t>3/22/2020</a:t>
+              <a:t>9/10/2020</a:t>
             </a:fld>
             <a:endParaRPr lang="en-US"/>
           </a:p>
@@ -667,7 +668,7 @@
           <a:p>
             <a:fld id="{001A219B-7441-422C-8DCF-B69CF4F9A207}" type="datetimeFigureOut">
               <a:rPr lang="en-US" smtClean="0"/>
-              <a:t>3/22/2020</a:t>
+              <a:t>9/10/2020</a:t>
             </a:fld>
             <a:endParaRPr lang="en-US"/>
           </a:p>
@@ -865,7 +866,7 @@
           <a:p>
             <a:fld id="{001A219B-7441-422C-8DCF-B69CF4F9A207}" type="datetimeFigureOut">
               <a:rPr lang="en-US" smtClean="0"/>
-              <a:t>3/22/2020</a:t>
+              <a:t>9/10/2020</a:t>
             </a:fld>
             <a:endParaRPr lang="en-US"/>
           </a:p>
@@ -1140,7 +1141,7 @@
           <a:p>
             <a:fld id="{001A219B-7441-422C-8DCF-B69CF4F9A207}" type="datetimeFigureOut">
               <a:rPr lang="en-US" smtClean="0"/>
-              <a:t>3/22/2020</a:t>
+              <a:t>9/10/2020</a:t>
             </a:fld>
             <a:endParaRPr lang="en-US"/>
           </a:p>
@@ -1405,7 +1406,7 @@
           <a:p>
             <a:fld id="{001A219B-7441-422C-8DCF-B69CF4F9A207}" type="datetimeFigureOut">
               <a:rPr lang="en-US" smtClean="0"/>
-              <a:t>3/22/2020</a:t>
+              <a:t>9/10/2020</a:t>
             </a:fld>
             <a:endParaRPr lang="en-US"/>
           </a:p>
@@ -1817,7 +1818,7 @@
           <a:p>
             <a:fld id="{001A219B-7441-422C-8DCF-B69CF4F9A207}" type="datetimeFigureOut">
               <a:rPr lang="en-US" smtClean="0"/>
-              <a:t>3/22/2020</a:t>
+              <a:t>9/10/2020</a:t>
             </a:fld>
             <a:endParaRPr lang="en-US"/>
           </a:p>
@@ -1958,7 +1959,7 @@
           <a:p>
             <a:fld id="{001A219B-7441-422C-8DCF-B69CF4F9A207}" type="datetimeFigureOut">
               <a:rPr lang="en-US" smtClean="0"/>
-              <a:t>3/22/2020</a:t>
+              <a:t>9/10/2020</a:t>
             </a:fld>
             <a:endParaRPr lang="en-US"/>
           </a:p>
@@ -2071,7 +2072,7 @@
           <a:p>
             <a:fld id="{001A219B-7441-422C-8DCF-B69CF4F9A207}" type="datetimeFigureOut">
               <a:rPr lang="en-US" smtClean="0"/>
-              <a:t>3/22/2020</a:t>
+              <a:t>9/10/2020</a:t>
             </a:fld>
             <a:endParaRPr lang="en-US"/>
           </a:p>
@@ -2382,7 +2383,7 @@
           <a:p>
             <a:fld id="{001A219B-7441-422C-8DCF-B69CF4F9A207}" type="datetimeFigureOut">
               <a:rPr lang="en-US" smtClean="0"/>
-              <a:t>3/22/2020</a:t>
+              <a:t>9/10/2020</a:t>
             </a:fld>
             <a:endParaRPr lang="en-US"/>
           </a:p>
@@ -2670,7 +2671,7 @@
           <a:p>
             <a:fld id="{001A219B-7441-422C-8DCF-B69CF4F9A207}" type="datetimeFigureOut">
               <a:rPr lang="en-US" smtClean="0"/>
-              <a:t>3/22/2020</a:t>
+              <a:t>9/10/2020</a:t>
             </a:fld>
             <a:endParaRPr lang="en-US"/>
           </a:p>
@@ -2911,7 +2912,7 @@
           <a:p>
             <a:fld id="{001A219B-7441-422C-8DCF-B69CF4F9A207}" type="datetimeFigureOut">
               <a:rPr lang="en-US" smtClean="0"/>
-              <a:t>3/22/2020</a:t>
+              <a:t>9/10/2020</a:t>
             </a:fld>
             <a:endParaRPr lang="en-US"/>
           </a:p>
@@ -3421,22 +3422,7 @@
                   <a:schemeClr val="tx1"/>
                 </a:solidFill>
               </a:rPr>
-              <a:t>Source code in </a:t>
-            </a:r>
-            <a:br>
-              <a:rPr lang="en-US" sz="1200" dirty="0">
-                <a:solidFill>
-                  <a:schemeClr val="tx1"/>
-                </a:solidFill>
-              </a:rPr>
-            </a:br>
-            <a:r>
-              <a:rPr lang="en-US" sz="1200" dirty="0">
-                <a:solidFill>
-                  <a:schemeClr val="tx1"/>
-                </a:solidFill>
-              </a:rPr>
-              <a:t>a text editor</a:t>
+              <a:t>Full source code in a text editor</a:t>
             </a:r>
           </a:p>
         </p:txBody>
@@ -3456,7 +3442,7 @@
         <p:spPr>
           <a:xfrm>
             <a:off x="6577257" y="2856077"/>
-            <a:ext cx="1336084" cy="446887"/>
+            <a:ext cx="1502818" cy="446887"/>
           </a:xfrm>
           <a:prstGeom prst="rect">
             <a:avLst/>
@@ -3504,7 +3490,7 @@
                   <a:schemeClr val="tx1"/>
                 </a:solidFill>
               </a:rPr>
-              <a:t>Context-sensitive auto-complete</a:t>
+              <a:t>Programming via iterative prompting</a:t>
             </a:r>
           </a:p>
         </p:txBody>
@@ -3523,8 +3509,8 @@
         </p:nvSpPr>
         <p:spPr>
           <a:xfrm>
-            <a:off x="6274630" y="5191826"/>
-            <a:ext cx="1336084" cy="446887"/>
+            <a:off x="6274629" y="5191826"/>
+            <a:ext cx="1414381" cy="446887"/>
           </a:xfrm>
           <a:prstGeom prst="rect">
             <a:avLst/>
@@ -3572,7 +3558,7 @@
                   <a:schemeClr val="tx1"/>
                 </a:solidFill>
               </a:rPr>
-              <a:t>Instantaneous result preview </a:t>
+              <a:t>Instantaneous preview of results</a:t>
             </a:r>
           </a:p>
         </p:txBody>
@@ -3811,6 +3797,479 @@
           <a:chExt cx="0" cy="0"/>
         </a:xfrm>
       </p:grpSpPr>
+      <p:pic>
+        <p:nvPicPr>
+          <p:cNvPr id="4" name="Picture 3">
+            <a:extLst>
+              <a:ext uri="{FF2B5EF4-FFF2-40B4-BE49-F238E27FC236}">
+                <a16:creationId xmlns:a16="http://schemas.microsoft.com/office/drawing/2014/main" id="{270A411F-9189-42AA-A7E9-FA55407B697E}"/>
+              </a:ext>
+            </a:extLst>
+          </p:cNvPr>
+          <p:cNvPicPr>
+            <a:picLocks noChangeAspect="1"/>
+          </p:cNvPicPr>
+          <p:nvPr/>
+        </p:nvPicPr>
+        <p:blipFill>
+          <a:blip r:embed="rId2">
+            <a:extLst>
+              <a:ext uri="{28A0092B-C50C-407E-A947-70E740481C1C}">
+                <a14:useLocalDpi xmlns:a14="http://schemas.microsoft.com/office/drawing/2010/main" val="0"/>
+              </a:ext>
+            </a:extLst>
+          </a:blip>
+          <a:srcRect/>
+          <a:stretch/>
+        </p:blipFill>
+        <p:spPr>
+          <a:xfrm>
+            <a:off x="2193604" y="918373"/>
+            <a:ext cx="4749068" cy="4319631"/>
+          </a:xfrm>
+          <a:prstGeom prst="rect">
+            <a:avLst/>
+          </a:prstGeom>
+        </p:spPr>
+      </p:pic>
+      <p:sp>
+        <p:nvSpPr>
+          <p:cNvPr id="7" name="Rectangle 6">
+            <a:extLst>
+              <a:ext uri="{FF2B5EF4-FFF2-40B4-BE49-F238E27FC236}">
+                <a16:creationId xmlns:a16="http://schemas.microsoft.com/office/drawing/2014/main" id="{C8F87FA0-A4FF-4DE1-BE71-F8C7DA45196E}"/>
+              </a:ext>
+            </a:extLst>
+          </p:cNvPr>
+          <p:cNvSpPr/>
+          <p:nvPr/>
+        </p:nvSpPr>
+        <p:spPr>
+          <a:xfrm>
+            <a:off x="1955984" y="2706257"/>
+            <a:ext cx="1217757" cy="446887"/>
+          </a:xfrm>
+          <a:prstGeom prst="rect">
+            <a:avLst/>
+          </a:prstGeom>
+          <a:solidFill>
+            <a:schemeClr val="bg1"/>
+          </a:solidFill>
+          <a:ln>
+            <a:solidFill>
+              <a:schemeClr val="tx1"/>
+            </a:solidFill>
+          </a:ln>
+          <a:effectLst>
+            <a:outerShdw blurRad="50800" dist="12700" dir="2700000" algn="tl" rotWithShape="0">
+              <a:prstClr val="black">
+                <a:alpha val="40000"/>
+              </a:prstClr>
+            </a:outerShdw>
+          </a:effectLst>
+        </p:spPr>
+        <p:style>
+          <a:lnRef idx="2">
+            <a:schemeClr val="accent1">
+              <a:shade val="50000"/>
+            </a:schemeClr>
+          </a:lnRef>
+          <a:fillRef idx="1">
+            <a:schemeClr val="accent1"/>
+          </a:fillRef>
+          <a:effectRef idx="0">
+            <a:schemeClr val="accent1"/>
+          </a:effectRef>
+          <a:fontRef idx="minor">
+            <a:schemeClr val="lt1"/>
+          </a:fontRef>
+        </p:style>
+        <p:txBody>
+          <a:bodyPr rtlCol="0" anchor="ctr"/>
+          <a:lstStyle/>
+          <a:p>
+            <a:pPr algn="ctr"/>
+            <a:r>
+              <a:rPr lang="en-US" sz="1200" dirty="0">
+                <a:solidFill>
+                  <a:schemeClr val="tx1"/>
+                </a:solidFill>
+              </a:rPr>
+              <a:t>Full source code in a text editor</a:t>
+            </a:r>
+          </a:p>
+        </p:txBody>
+      </p:sp>
+      <p:sp>
+        <p:nvSpPr>
+          <p:cNvPr id="8" name="Rectangle 7">
+            <a:extLst>
+              <a:ext uri="{FF2B5EF4-FFF2-40B4-BE49-F238E27FC236}">
+                <a16:creationId xmlns:a16="http://schemas.microsoft.com/office/drawing/2014/main" id="{DFBF1C95-D3BF-4B70-8591-5523F32E3968}"/>
+              </a:ext>
+            </a:extLst>
+          </p:cNvPr>
+          <p:cNvSpPr/>
+          <p:nvPr/>
+        </p:nvSpPr>
+        <p:spPr>
+          <a:xfrm>
+            <a:off x="6577257" y="2856077"/>
+            <a:ext cx="1502818" cy="446887"/>
+          </a:xfrm>
+          <a:prstGeom prst="rect">
+            <a:avLst/>
+          </a:prstGeom>
+          <a:solidFill>
+            <a:schemeClr val="bg1"/>
+          </a:solidFill>
+          <a:ln>
+            <a:solidFill>
+              <a:schemeClr val="tx1"/>
+            </a:solidFill>
+          </a:ln>
+          <a:effectLst>
+            <a:outerShdw blurRad="50800" dist="12700" dir="2700000" algn="tl" rotWithShape="0">
+              <a:prstClr val="black">
+                <a:alpha val="40000"/>
+              </a:prstClr>
+            </a:outerShdw>
+          </a:effectLst>
+        </p:spPr>
+        <p:style>
+          <a:lnRef idx="2">
+            <a:schemeClr val="accent1">
+              <a:shade val="50000"/>
+            </a:schemeClr>
+          </a:lnRef>
+          <a:fillRef idx="1">
+            <a:schemeClr val="accent1"/>
+          </a:fillRef>
+          <a:effectRef idx="0">
+            <a:schemeClr val="accent1"/>
+          </a:effectRef>
+          <a:fontRef idx="minor">
+            <a:schemeClr val="lt1"/>
+          </a:fontRef>
+        </p:style>
+        <p:txBody>
+          <a:bodyPr rtlCol="0" anchor="ctr"/>
+          <a:lstStyle/>
+          <a:p>
+            <a:pPr algn="ctr"/>
+            <a:r>
+              <a:rPr lang="en-US" sz="1200" dirty="0">
+                <a:solidFill>
+                  <a:schemeClr val="tx1"/>
+                </a:solidFill>
+              </a:rPr>
+              <a:t>Programming via iterative prompting</a:t>
+            </a:r>
+          </a:p>
+        </p:txBody>
+      </p:sp>
+      <p:sp>
+        <p:nvSpPr>
+          <p:cNvPr id="9" name="Rectangle 8">
+            <a:extLst>
+              <a:ext uri="{FF2B5EF4-FFF2-40B4-BE49-F238E27FC236}">
+                <a16:creationId xmlns:a16="http://schemas.microsoft.com/office/drawing/2014/main" id="{0C74CD99-868C-403B-9A37-2273A8CEB96B}"/>
+              </a:ext>
+            </a:extLst>
+          </p:cNvPr>
+          <p:cNvSpPr/>
+          <p:nvPr/>
+        </p:nvSpPr>
+        <p:spPr>
+          <a:xfrm>
+            <a:off x="6274629" y="4656983"/>
+            <a:ext cx="1414381" cy="446887"/>
+          </a:xfrm>
+          <a:prstGeom prst="rect">
+            <a:avLst/>
+          </a:prstGeom>
+          <a:solidFill>
+            <a:schemeClr val="bg1"/>
+          </a:solidFill>
+          <a:ln>
+            <a:solidFill>
+              <a:schemeClr val="tx1"/>
+            </a:solidFill>
+          </a:ln>
+          <a:effectLst>
+            <a:outerShdw blurRad="50800" dist="12700" dir="2700000" algn="tl" rotWithShape="0">
+              <a:prstClr val="black">
+                <a:alpha val="40000"/>
+              </a:prstClr>
+            </a:outerShdw>
+          </a:effectLst>
+        </p:spPr>
+        <p:style>
+          <a:lnRef idx="2">
+            <a:schemeClr val="accent1">
+              <a:shade val="50000"/>
+            </a:schemeClr>
+          </a:lnRef>
+          <a:fillRef idx="1">
+            <a:schemeClr val="accent1"/>
+          </a:fillRef>
+          <a:effectRef idx="0">
+            <a:schemeClr val="accent1"/>
+          </a:effectRef>
+          <a:fontRef idx="minor">
+            <a:schemeClr val="lt1"/>
+          </a:fontRef>
+        </p:style>
+        <p:txBody>
+          <a:bodyPr rtlCol="0" anchor="ctr"/>
+          <a:lstStyle/>
+          <a:p>
+            <a:pPr algn="ctr"/>
+            <a:r>
+              <a:rPr lang="en-US" sz="1200" dirty="0">
+                <a:solidFill>
+                  <a:schemeClr val="tx1"/>
+                </a:solidFill>
+              </a:rPr>
+              <a:t>Instantaneous preview of results</a:t>
+            </a:r>
+          </a:p>
+        </p:txBody>
+      </p:sp>
+      <p:sp>
+        <p:nvSpPr>
+          <p:cNvPr id="10" name="Oval 9">
+            <a:extLst>
+              <a:ext uri="{FF2B5EF4-FFF2-40B4-BE49-F238E27FC236}">
+                <a16:creationId xmlns:a16="http://schemas.microsoft.com/office/drawing/2014/main" id="{642B03E5-F95B-41CF-85F2-287BA340033B}"/>
+              </a:ext>
+            </a:extLst>
+          </p:cNvPr>
+          <p:cNvSpPr/>
+          <p:nvPr/>
+        </p:nvSpPr>
+        <p:spPr>
+          <a:xfrm>
+            <a:off x="2062975" y="2268574"/>
+            <a:ext cx="261257" cy="261257"/>
+          </a:xfrm>
+          <a:prstGeom prst="ellipse">
+            <a:avLst/>
+          </a:prstGeom>
+          <a:solidFill>
+            <a:schemeClr val="bg1"/>
+          </a:solidFill>
+          <a:ln>
+            <a:solidFill>
+              <a:schemeClr val="tx1"/>
+            </a:solidFill>
+          </a:ln>
+          <a:effectLst>
+            <a:outerShdw blurRad="50800" dist="12700" dir="2700000" algn="tl" rotWithShape="0">
+              <a:prstClr val="black">
+                <a:alpha val="40000"/>
+              </a:prstClr>
+            </a:outerShdw>
+          </a:effectLst>
+        </p:spPr>
+        <p:style>
+          <a:lnRef idx="2">
+            <a:schemeClr val="accent1">
+              <a:shade val="50000"/>
+            </a:schemeClr>
+          </a:lnRef>
+          <a:fillRef idx="1">
+            <a:schemeClr val="accent1"/>
+          </a:fillRef>
+          <a:effectRef idx="0">
+            <a:schemeClr val="accent1"/>
+          </a:effectRef>
+          <a:fontRef idx="minor">
+            <a:schemeClr val="lt1"/>
+          </a:fontRef>
+        </p:style>
+        <p:txBody>
+          <a:bodyPr rtlCol="0" anchor="ctr"/>
+          <a:lstStyle/>
+          <a:p>
+            <a:pPr algn="ctr"/>
+            <a:r>
+              <a:rPr lang="en-US" sz="1200" b="1" dirty="0">
+                <a:solidFill>
+                  <a:schemeClr val="tx1"/>
+                </a:solidFill>
+              </a:rPr>
+              <a:t>1</a:t>
+            </a:r>
+          </a:p>
+        </p:txBody>
+      </p:sp>
+      <p:sp>
+        <p:nvSpPr>
+          <p:cNvPr id="11" name="Oval 10">
+            <a:extLst>
+              <a:ext uri="{FF2B5EF4-FFF2-40B4-BE49-F238E27FC236}">
+                <a16:creationId xmlns:a16="http://schemas.microsoft.com/office/drawing/2014/main" id="{1C5315F6-CB55-48F5-BD8D-1522B19C1D5F}"/>
+              </a:ext>
+            </a:extLst>
+          </p:cNvPr>
+          <p:cNvSpPr/>
+          <p:nvPr/>
+        </p:nvSpPr>
+        <p:spPr>
+          <a:xfrm>
+            <a:off x="6446628" y="2445000"/>
+            <a:ext cx="261257" cy="261257"/>
+          </a:xfrm>
+          <a:prstGeom prst="ellipse">
+            <a:avLst/>
+          </a:prstGeom>
+          <a:solidFill>
+            <a:schemeClr val="bg1"/>
+          </a:solidFill>
+          <a:ln>
+            <a:solidFill>
+              <a:schemeClr val="tx1"/>
+            </a:solidFill>
+          </a:ln>
+          <a:effectLst>
+            <a:outerShdw blurRad="50800" dist="12700" dir="2700000" algn="tl" rotWithShape="0">
+              <a:prstClr val="black">
+                <a:alpha val="40000"/>
+              </a:prstClr>
+            </a:outerShdw>
+          </a:effectLst>
+        </p:spPr>
+        <p:style>
+          <a:lnRef idx="2">
+            <a:schemeClr val="accent1">
+              <a:shade val="50000"/>
+            </a:schemeClr>
+          </a:lnRef>
+          <a:fillRef idx="1">
+            <a:schemeClr val="accent1"/>
+          </a:fillRef>
+          <a:effectRef idx="0">
+            <a:schemeClr val="accent1"/>
+          </a:effectRef>
+          <a:fontRef idx="minor">
+            <a:schemeClr val="lt1"/>
+          </a:fontRef>
+        </p:style>
+        <p:txBody>
+          <a:bodyPr rtlCol="0" anchor="ctr"/>
+          <a:lstStyle/>
+          <a:p>
+            <a:pPr algn="ctr"/>
+            <a:r>
+              <a:rPr lang="en-US" sz="1200" b="1" dirty="0">
+                <a:solidFill>
+                  <a:schemeClr val="tx1"/>
+                </a:solidFill>
+              </a:rPr>
+              <a:t>2</a:t>
+            </a:r>
+          </a:p>
+        </p:txBody>
+      </p:sp>
+      <p:sp>
+        <p:nvSpPr>
+          <p:cNvPr id="12" name="Oval 11">
+            <a:extLst>
+              <a:ext uri="{FF2B5EF4-FFF2-40B4-BE49-F238E27FC236}">
+                <a16:creationId xmlns:a16="http://schemas.microsoft.com/office/drawing/2014/main" id="{4C8368D2-4991-4146-9D66-0404203EBAB6}"/>
+              </a:ext>
+            </a:extLst>
+          </p:cNvPr>
+          <p:cNvSpPr/>
+          <p:nvPr/>
+        </p:nvSpPr>
+        <p:spPr>
+          <a:xfrm>
+            <a:off x="6446627" y="4279224"/>
+            <a:ext cx="261257" cy="261257"/>
+          </a:xfrm>
+          <a:prstGeom prst="ellipse">
+            <a:avLst/>
+          </a:prstGeom>
+          <a:solidFill>
+            <a:schemeClr val="bg1"/>
+          </a:solidFill>
+          <a:ln>
+            <a:solidFill>
+              <a:schemeClr val="tx1"/>
+            </a:solidFill>
+          </a:ln>
+          <a:effectLst>
+            <a:outerShdw blurRad="50800" dist="12700" dir="2700000" algn="tl" rotWithShape="0">
+              <a:prstClr val="black">
+                <a:alpha val="40000"/>
+              </a:prstClr>
+            </a:outerShdw>
+          </a:effectLst>
+        </p:spPr>
+        <p:style>
+          <a:lnRef idx="2">
+            <a:schemeClr val="accent1">
+              <a:shade val="50000"/>
+            </a:schemeClr>
+          </a:lnRef>
+          <a:fillRef idx="1">
+            <a:schemeClr val="accent1"/>
+          </a:fillRef>
+          <a:effectRef idx="0">
+            <a:schemeClr val="accent1"/>
+          </a:effectRef>
+          <a:fontRef idx="minor">
+            <a:schemeClr val="lt1"/>
+          </a:fontRef>
+        </p:style>
+        <p:txBody>
+          <a:bodyPr rtlCol="0" anchor="ctr"/>
+          <a:lstStyle/>
+          <a:p>
+            <a:pPr algn="ctr"/>
+            <a:r>
+              <a:rPr lang="en-US" sz="1200" b="1" dirty="0">
+                <a:solidFill>
+                  <a:schemeClr val="tx1"/>
+                </a:solidFill>
+              </a:rPr>
+              <a:t>3</a:t>
+            </a:r>
+          </a:p>
+        </p:txBody>
+      </p:sp>
+    </p:spTree>
+    <p:extLst>
+      <p:ext uri="{BB962C8B-B14F-4D97-AF65-F5344CB8AC3E}">
+        <p14:creationId xmlns:p14="http://schemas.microsoft.com/office/powerpoint/2010/main" val="1564940178"/>
+      </p:ext>
+    </p:extLst>
+  </p:cSld>
+  <p:clrMapOvr>
+    <a:masterClrMapping/>
+  </p:clrMapOvr>
+</p:sld>
+</file>
+
+<file path=ppt/slides/slide3.xml><?xml version="1.0" encoding="utf-8"?>
+<p:sld xmlns:a="http://schemas.openxmlformats.org/drawingml/2006/main" xmlns:r="http://schemas.openxmlformats.org/officeDocument/2006/relationships" xmlns:p="http://schemas.openxmlformats.org/presentationml/2006/main">
+  <p:cSld>
+    <p:spTree>
+      <p:nvGrpSpPr>
+        <p:cNvPr id="1" name=""/>
+        <p:cNvGrpSpPr/>
+        <p:nvPr/>
+      </p:nvGrpSpPr>
+      <p:grpSpPr>
+        <a:xfrm>
+          <a:off x="0" y="0"/>
+          <a:ext cx="0" cy="0"/>
+          <a:chOff x="0" y="0"/>
+          <a:chExt cx="0" cy="0"/>
+        </a:xfrm>
+      </p:grpSpPr>
       <p:sp>
         <p:nvSpPr>
           <p:cNvPr id="4" name="Parallelogram 3">
@@ -4880,7 +5339,7 @@
 </p:sld>
 </file>
 
-<file path=ppt/slides/slide3.xml><?xml version="1.0" encoding="utf-8"?>
+<file path=ppt/slides/slide4.xml><?xml version="1.0" encoding="utf-8"?>
 <p:sld xmlns:a="http://schemas.openxmlformats.org/drawingml/2006/main" xmlns:r="http://schemas.openxmlformats.org/officeDocument/2006/relationships" xmlns:p="http://schemas.openxmlformats.org/presentationml/2006/main">
   <p:cSld>
     <p:spTree>

</xml_diff>

<commit_message>
Edit overview, move implementation
</commit_message>
<xml_diff>
--- a/wip-design/figures/thegamma.pptx
+++ b/wip-design/figures/thegamma.pptx
@@ -150,7 +150,7 @@
         </p:nvSpPr>
         <p:spPr>
           <a:xfrm>
-            <a:off x="1524000" y="1122363"/>
+            <a:off x="1524001" y="1122363"/>
             <a:ext cx="9144000" cy="2387600"/>
           </a:xfrm>
         </p:spPr>
@@ -187,7 +187,7 @@
         </p:nvSpPr>
         <p:spPr>
           <a:xfrm>
-            <a:off x="1524000" y="3602038"/>
+            <a:off x="1524001" y="3602038"/>
             <a:ext cx="9144000" cy="1655762"/>
           </a:xfrm>
         </p:spPr>
@@ -198,35 +198,35 @@
               <a:buNone/>
               <a:defRPr sz="2400"/>
             </a:lvl1pPr>
-            <a:lvl2pPr marL="457200" indent="0" algn="ctr">
+            <a:lvl2pPr marL="457199" indent="0" algn="ctr">
               <a:buNone/>
               <a:defRPr sz="2000"/>
             </a:lvl2pPr>
-            <a:lvl3pPr marL="914400" indent="0" algn="ctr">
+            <a:lvl3pPr marL="914398" indent="0" algn="ctr">
               <a:buNone/>
               <a:defRPr sz="1800"/>
             </a:lvl3pPr>
-            <a:lvl4pPr marL="1371600" indent="0" algn="ctr">
+            <a:lvl4pPr marL="1371597" indent="0" algn="ctr">
               <a:buNone/>
               <a:defRPr sz="1600"/>
             </a:lvl4pPr>
-            <a:lvl5pPr marL="1828800" indent="0" algn="ctr">
+            <a:lvl5pPr marL="1828796" indent="0" algn="ctr">
               <a:buNone/>
               <a:defRPr sz="1600"/>
             </a:lvl5pPr>
-            <a:lvl6pPr marL="2286000" indent="0" algn="ctr">
+            <a:lvl6pPr marL="2285996" indent="0" algn="ctr">
               <a:buNone/>
               <a:defRPr sz="1600"/>
             </a:lvl6pPr>
-            <a:lvl7pPr marL="2743200" indent="0" algn="ctr">
+            <a:lvl7pPr marL="2743194" indent="0" algn="ctr">
               <a:buNone/>
               <a:defRPr sz="1600"/>
             </a:lvl7pPr>
-            <a:lvl8pPr marL="3200400" indent="0" algn="ctr">
+            <a:lvl8pPr marL="3200394" indent="0" algn="ctr">
               <a:buNone/>
               <a:defRPr sz="1600"/>
             </a:lvl8pPr>
-            <a:lvl9pPr marL="3657600" indent="0" algn="ctr">
+            <a:lvl9pPr marL="3657592" indent="0" algn="ctr">
               <a:buNone/>
               <a:defRPr sz="1600"/>
             </a:lvl9pPr>
@@ -262,7 +262,7 @@
           <a:p>
             <a:fld id="{001A219B-7441-422C-8DCF-B69CF4F9A207}" type="datetimeFigureOut">
               <a:rPr lang="en-US" smtClean="0"/>
-              <a:t>9/10/2020</a:t>
+              <a:t>9/11/2020</a:t>
             </a:fld>
             <a:endParaRPr lang="en-US"/>
           </a:p>
@@ -460,7 +460,7 @@
           <a:p>
             <a:fld id="{001A219B-7441-422C-8DCF-B69CF4F9A207}" type="datetimeFigureOut">
               <a:rPr lang="en-US" smtClean="0"/>
-              <a:t>9/10/2020</a:t>
+              <a:t>9/11/2020</a:t>
             </a:fld>
             <a:endParaRPr lang="en-US"/>
           </a:p>
@@ -601,7 +601,7 @@
         </p:nvSpPr>
         <p:spPr>
           <a:xfrm>
-            <a:off x="838200" y="365125"/>
+            <a:off x="838201" y="365125"/>
             <a:ext cx="7734300" cy="5811838"/>
           </a:xfrm>
         </p:spPr>
@@ -668,7 +668,7 @@
           <a:p>
             <a:fld id="{001A219B-7441-422C-8DCF-B69CF4F9A207}" type="datetimeFigureOut">
               <a:rPr lang="en-US" smtClean="0"/>
-              <a:t>9/10/2020</a:t>
+              <a:t>9/11/2020</a:t>
             </a:fld>
             <a:endParaRPr lang="en-US"/>
           </a:p>
@@ -866,7 +866,7 @@
           <a:p>
             <a:fld id="{001A219B-7441-422C-8DCF-B69CF4F9A207}" type="datetimeFigureOut">
               <a:rPr lang="en-US" smtClean="0"/>
-              <a:t>9/10/2020</a:t>
+              <a:t>9/11/2020</a:t>
             </a:fld>
             <a:endParaRPr lang="en-US"/>
           </a:p>
@@ -974,7 +974,7 @@
         </p:nvSpPr>
         <p:spPr>
           <a:xfrm>
-            <a:off x="831850" y="1709738"/>
+            <a:off x="831850" y="1709740"/>
             <a:ext cx="10515600" cy="2852737"/>
           </a:xfrm>
         </p:spPr>
@@ -1011,7 +1011,7 @@
         </p:nvSpPr>
         <p:spPr>
           <a:xfrm>
-            <a:off x="831850" y="4589463"/>
+            <a:off x="831850" y="4589465"/>
             <a:ext cx="10515600" cy="1500187"/>
           </a:xfrm>
         </p:spPr>
@@ -1028,7 +1028,7 @@
                 </a:solidFill>
               </a:defRPr>
             </a:lvl1pPr>
-            <a:lvl2pPr marL="457200" indent="0">
+            <a:lvl2pPr marL="457199" indent="0">
               <a:buNone/>
               <a:defRPr sz="2000">
                 <a:solidFill>
@@ -1038,7 +1038,7 @@
                 </a:solidFill>
               </a:defRPr>
             </a:lvl2pPr>
-            <a:lvl3pPr marL="914400" indent="0">
+            <a:lvl3pPr marL="914398" indent="0">
               <a:buNone/>
               <a:defRPr sz="1800">
                 <a:solidFill>
@@ -1048,7 +1048,7 @@
                 </a:solidFill>
               </a:defRPr>
             </a:lvl3pPr>
-            <a:lvl4pPr marL="1371600" indent="0">
+            <a:lvl4pPr marL="1371597" indent="0">
               <a:buNone/>
               <a:defRPr sz="1600">
                 <a:solidFill>
@@ -1058,7 +1058,7 @@
                 </a:solidFill>
               </a:defRPr>
             </a:lvl4pPr>
-            <a:lvl5pPr marL="1828800" indent="0">
+            <a:lvl5pPr marL="1828796" indent="0">
               <a:buNone/>
               <a:defRPr sz="1600">
                 <a:solidFill>
@@ -1068,7 +1068,7 @@
                 </a:solidFill>
               </a:defRPr>
             </a:lvl5pPr>
-            <a:lvl6pPr marL="2286000" indent="0">
+            <a:lvl6pPr marL="2285996" indent="0">
               <a:buNone/>
               <a:defRPr sz="1600">
                 <a:solidFill>
@@ -1078,7 +1078,7 @@
                 </a:solidFill>
               </a:defRPr>
             </a:lvl6pPr>
-            <a:lvl7pPr marL="2743200" indent="0">
+            <a:lvl7pPr marL="2743194" indent="0">
               <a:buNone/>
               <a:defRPr sz="1600">
                 <a:solidFill>
@@ -1088,7 +1088,7 @@
                 </a:solidFill>
               </a:defRPr>
             </a:lvl7pPr>
-            <a:lvl8pPr marL="3200400" indent="0">
+            <a:lvl8pPr marL="3200394" indent="0">
               <a:buNone/>
               <a:defRPr sz="1600">
                 <a:solidFill>
@@ -1098,7 +1098,7 @@
                 </a:solidFill>
               </a:defRPr>
             </a:lvl8pPr>
-            <a:lvl9pPr marL="3657600" indent="0">
+            <a:lvl9pPr marL="3657592" indent="0">
               <a:buNone/>
               <a:defRPr sz="1600">
                 <a:solidFill>
@@ -1141,7 +1141,7 @@
           <a:p>
             <a:fld id="{001A219B-7441-422C-8DCF-B69CF4F9A207}" type="datetimeFigureOut">
               <a:rPr lang="en-US" smtClean="0"/>
-              <a:t>9/10/2020</a:t>
+              <a:t>9/11/2020</a:t>
             </a:fld>
             <a:endParaRPr lang="en-US"/>
           </a:p>
@@ -1277,7 +1277,7 @@
         </p:nvSpPr>
         <p:spPr>
           <a:xfrm>
-            <a:off x="838200" y="1825625"/>
+            <a:off x="838201" y="1825625"/>
             <a:ext cx="5181600" cy="4351338"/>
           </a:xfrm>
         </p:spPr>
@@ -1406,7 +1406,7 @@
           <a:p>
             <a:fld id="{001A219B-7441-422C-8DCF-B69CF4F9A207}" type="datetimeFigureOut">
               <a:rPr lang="en-US" smtClean="0"/>
-              <a:t>9/10/2020</a:t>
+              <a:t>9/11/2020</a:t>
             </a:fld>
             <a:endParaRPr lang="en-US"/>
           </a:p>
@@ -1514,7 +1514,7 @@
         </p:nvSpPr>
         <p:spPr>
           <a:xfrm>
-            <a:off x="839788" y="365125"/>
+            <a:off x="839788" y="365127"/>
             <a:ext cx="10515600" cy="1325563"/>
           </a:xfrm>
         </p:spPr>
@@ -1547,8 +1547,8 @@
         </p:nvSpPr>
         <p:spPr>
           <a:xfrm>
-            <a:off x="839788" y="1681163"/>
-            <a:ext cx="5157787" cy="823912"/>
+            <a:off x="839788" y="1681164"/>
+            <a:ext cx="5157788" cy="823912"/>
           </a:xfrm>
         </p:spPr>
         <p:txBody>
@@ -1558,35 +1558,35 @@
               <a:buNone/>
               <a:defRPr sz="2400" b="1"/>
             </a:lvl1pPr>
-            <a:lvl2pPr marL="457200" indent="0">
+            <a:lvl2pPr marL="457199" indent="0">
               <a:buNone/>
               <a:defRPr sz="2000" b="1"/>
             </a:lvl2pPr>
-            <a:lvl3pPr marL="914400" indent="0">
+            <a:lvl3pPr marL="914398" indent="0">
               <a:buNone/>
               <a:defRPr sz="1800" b="1"/>
             </a:lvl3pPr>
-            <a:lvl4pPr marL="1371600" indent="0">
+            <a:lvl4pPr marL="1371597" indent="0">
               <a:buNone/>
               <a:defRPr sz="1600" b="1"/>
             </a:lvl4pPr>
-            <a:lvl5pPr marL="1828800" indent="0">
+            <a:lvl5pPr marL="1828796" indent="0">
               <a:buNone/>
               <a:defRPr sz="1600" b="1"/>
             </a:lvl5pPr>
-            <a:lvl6pPr marL="2286000" indent="0">
+            <a:lvl6pPr marL="2285996" indent="0">
               <a:buNone/>
               <a:defRPr sz="1600" b="1"/>
             </a:lvl6pPr>
-            <a:lvl7pPr marL="2743200" indent="0">
+            <a:lvl7pPr marL="2743194" indent="0">
               <a:buNone/>
               <a:defRPr sz="1600" b="1"/>
             </a:lvl7pPr>
-            <a:lvl8pPr marL="3200400" indent="0">
+            <a:lvl8pPr marL="3200394" indent="0">
               <a:buNone/>
               <a:defRPr sz="1600" b="1"/>
             </a:lvl8pPr>
-            <a:lvl9pPr marL="3657600" indent="0">
+            <a:lvl9pPr marL="3657592" indent="0">
               <a:buNone/>
               <a:defRPr sz="1600" b="1"/>
             </a:lvl9pPr>
@@ -1618,8 +1618,8 @@
         </p:nvSpPr>
         <p:spPr>
           <a:xfrm>
-            <a:off x="839788" y="2505075"/>
-            <a:ext cx="5157787" cy="3684588"/>
+            <a:off x="839788" y="2505076"/>
+            <a:ext cx="5157788" cy="3684588"/>
           </a:xfrm>
         </p:spPr>
         <p:txBody>
@@ -1680,7 +1680,7 @@
         </p:nvSpPr>
         <p:spPr>
           <a:xfrm>
-            <a:off x="6172200" y="1681163"/>
+            <a:off x="6172200" y="1681164"/>
             <a:ext cx="5183188" cy="823912"/>
           </a:xfrm>
         </p:spPr>
@@ -1691,35 +1691,35 @@
               <a:buNone/>
               <a:defRPr sz="2400" b="1"/>
             </a:lvl1pPr>
-            <a:lvl2pPr marL="457200" indent="0">
+            <a:lvl2pPr marL="457199" indent="0">
               <a:buNone/>
               <a:defRPr sz="2000" b="1"/>
             </a:lvl2pPr>
-            <a:lvl3pPr marL="914400" indent="0">
+            <a:lvl3pPr marL="914398" indent="0">
               <a:buNone/>
               <a:defRPr sz="1800" b="1"/>
             </a:lvl3pPr>
-            <a:lvl4pPr marL="1371600" indent="0">
+            <a:lvl4pPr marL="1371597" indent="0">
               <a:buNone/>
               <a:defRPr sz="1600" b="1"/>
             </a:lvl4pPr>
-            <a:lvl5pPr marL="1828800" indent="0">
+            <a:lvl5pPr marL="1828796" indent="0">
               <a:buNone/>
               <a:defRPr sz="1600" b="1"/>
             </a:lvl5pPr>
-            <a:lvl6pPr marL="2286000" indent="0">
+            <a:lvl6pPr marL="2285996" indent="0">
               <a:buNone/>
               <a:defRPr sz="1600" b="1"/>
             </a:lvl6pPr>
-            <a:lvl7pPr marL="2743200" indent="0">
+            <a:lvl7pPr marL="2743194" indent="0">
               <a:buNone/>
               <a:defRPr sz="1600" b="1"/>
             </a:lvl7pPr>
-            <a:lvl8pPr marL="3200400" indent="0">
+            <a:lvl8pPr marL="3200394" indent="0">
               <a:buNone/>
               <a:defRPr sz="1600" b="1"/>
             </a:lvl8pPr>
-            <a:lvl9pPr marL="3657600" indent="0">
+            <a:lvl9pPr marL="3657592" indent="0">
               <a:buNone/>
               <a:defRPr sz="1600" b="1"/>
             </a:lvl9pPr>
@@ -1751,7 +1751,7 @@
         </p:nvSpPr>
         <p:spPr>
           <a:xfrm>
-            <a:off x="6172200" y="2505075"/>
+            <a:off x="6172200" y="2505076"/>
             <a:ext cx="5183188" cy="3684588"/>
           </a:xfrm>
         </p:spPr>
@@ -1818,7 +1818,7 @@
           <a:p>
             <a:fld id="{001A219B-7441-422C-8DCF-B69CF4F9A207}" type="datetimeFigureOut">
               <a:rPr lang="en-US" smtClean="0"/>
-              <a:t>9/10/2020</a:t>
+              <a:t>9/11/2020</a:t>
             </a:fld>
             <a:endParaRPr lang="en-US"/>
           </a:p>
@@ -1959,7 +1959,7 @@
           <a:p>
             <a:fld id="{001A219B-7441-422C-8DCF-B69CF4F9A207}" type="datetimeFigureOut">
               <a:rPr lang="en-US" smtClean="0"/>
-              <a:t>9/10/2020</a:t>
+              <a:t>9/11/2020</a:t>
             </a:fld>
             <a:endParaRPr lang="en-US"/>
           </a:p>
@@ -2072,7 +2072,7 @@
           <a:p>
             <a:fld id="{001A219B-7441-422C-8DCF-B69CF4F9A207}" type="datetimeFigureOut">
               <a:rPr lang="en-US" smtClean="0"/>
-              <a:t>9/10/2020</a:t>
+              <a:t>9/11/2020</a:t>
             </a:fld>
             <a:endParaRPr lang="en-US"/>
           </a:p>
@@ -2180,7 +2180,7 @@
         </p:nvSpPr>
         <p:spPr>
           <a:xfrm>
-            <a:off x="839788" y="457200"/>
+            <a:off x="839791" y="457200"/>
             <a:ext cx="3932237" cy="1600200"/>
           </a:xfrm>
         </p:spPr>
@@ -2307,7 +2307,7 @@
         </p:nvSpPr>
         <p:spPr>
           <a:xfrm>
-            <a:off x="839788" y="2057400"/>
+            <a:off x="839791" y="2057400"/>
             <a:ext cx="3932237" cy="3811588"/>
           </a:xfrm>
         </p:spPr>
@@ -2318,35 +2318,35 @@
               <a:buNone/>
               <a:defRPr sz="1600"/>
             </a:lvl1pPr>
-            <a:lvl2pPr marL="457200" indent="0">
+            <a:lvl2pPr marL="457199" indent="0">
               <a:buNone/>
               <a:defRPr sz="1400"/>
             </a:lvl2pPr>
-            <a:lvl3pPr marL="914400" indent="0">
+            <a:lvl3pPr marL="914398" indent="0">
               <a:buNone/>
               <a:defRPr sz="1200"/>
             </a:lvl3pPr>
-            <a:lvl4pPr marL="1371600" indent="0">
+            <a:lvl4pPr marL="1371597" indent="0">
               <a:buNone/>
               <a:defRPr sz="1000"/>
             </a:lvl4pPr>
-            <a:lvl5pPr marL="1828800" indent="0">
+            <a:lvl5pPr marL="1828796" indent="0">
               <a:buNone/>
               <a:defRPr sz="1000"/>
             </a:lvl5pPr>
-            <a:lvl6pPr marL="2286000" indent="0">
+            <a:lvl6pPr marL="2285996" indent="0">
               <a:buNone/>
               <a:defRPr sz="1000"/>
             </a:lvl6pPr>
-            <a:lvl7pPr marL="2743200" indent="0">
+            <a:lvl7pPr marL="2743194" indent="0">
               <a:buNone/>
               <a:defRPr sz="1000"/>
             </a:lvl7pPr>
-            <a:lvl8pPr marL="3200400" indent="0">
+            <a:lvl8pPr marL="3200394" indent="0">
               <a:buNone/>
               <a:defRPr sz="1000"/>
             </a:lvl8pPr>
-            <a:lvl9pPr marL="3657600" indent="0">
+            <a:lvl9pPr marL="3657592" indent="0">
               <a:buNone/>
               <a:defRPr sz="1000"/>
             </a:lvl9pPr>
@@ -2383,7 +2383,7 @@
           <a:p>
             <a:fld id="{001A219B-7441-422C-8DCF-B69CF4F9A207}" type="datetimeFigureOut">
               <a:rPr lang="en-US" smtClean="0"/>
-              <a:t>9/10/2020</a:t>
+              <a:t>9/11/2020</a:t>
             </a:fld>
             <a:endParaRPr lang="en-US"/>
           </a:p>
@@ -2491,7 +2491,7 @@
         </p:nvSpPr>
         <p:spPr>
           <a:xfrm>
-            <a:off x="839788" y="457200"/>
+            <a:off x="839791" y="457200"/>
             <a:ext cx="3932237" cy="1600200"/>
           </a:xfrm>
         </p:spPr>
@@ -2539,35 +2539,35 @@
               <a:buNone/>
               <a:defRPr sz="3200"/>
             </a:lvl1pPr>
-            <a:lvl2pPr marL="457200" indent="0">
+            <a:lvl2pPr marL="457199" indent="0">
               <a:buNone/>
               <a:defRPr sz="2800"/>
             </a:lvl2pPr>
-            <a:lvl3pPr marL="914400" indent="0">
+            <a:lvl3pPr marL="914398" indent="0">
               <a:buNone/>
               <a:defRPr sz="2400"/>
             </a:lvl3pPr>
-            <a:lvl4pPr marL="1371600" indent="0">
+            <a:lvl4pPr marL="1371597" indent="0">
               <a:buNone/>
               <a:defRPr sz="2000"/>
             </a:lvl4pPr>
-            <a:lvl5pPr marL="1828800" indent="0">
+            <a:lvl5pPr marL="1828796" indent="0">
               <a:buNone/>
               <a:defRPr sz="2000"/>
             </a:lvl5pPr>
-            <a:lvl6pPr marL="2286000" indent="0">
+            <a:lvl6pPr marL="2285996" indent="0">
               <a:buNone/>
               <a:defRPr sz="2000"/>
             </a:lvl6pPr>
-            <a:lvl7pPr marL="2743200" indent="0">
+            <a:lvl7pPr marL="2743194" indent="0">
               <a:buNone/>
               <a:defRPr sz="2000"/>
             </a:lvl7pPr>
-            <a:lvl8pPr marL="3200400" indent="0">
+            <a:lvl8pPr marL="3200394" indent="0">
               <a:buNone/>
               <a:defRPr sz="2000"/>
             </a:lvl8pPr>
-            <a:lvl9pPr marL="3657600" indent="0">
+            <a:lvl9pPr marL="3657592" indent="0">
               <a:buNone/>
               <a:defRPr sz="2000"/>
             </a:lvl9pPr>
@@ -2595,7 +2595,7 @@
         </p:nvSpPr>
         <p:spPr>
           <a:xfrm>
-            <a:off x="839788" y="2057400"/>
+            <a:off x="839791" y="2057400"/>
             <a:ext cx="3932237" cy="3811588"/>
           </a:xfrm>
         </p:spPr>
@@ -2606,35 +2606,35 @@
               <a:buNone/>
               <a:defRPr sz="1600"/>
             </a:lvl1pPr>
-            <a:lvl2pPr marL="457200" indent="0">
+            <a:lvl2pPr marL="457199" indent="0">
               <a:buNone/>
               <a:defRPr sz="1400"/>
             </a:lvl2pPr>
-            <a:lvl3pPr marL="914400" indent="0">
+            <a:lvl3pPr marL="914398" indent="0">
               <a:buNone/>
               <a:defRPr sz="1200"/>
             </a:lvl3pPr>
-            <a:lvl4pPr marL="1371600" indent="0">
+            <a:lvl4pPr marL="1371597" indent="0">
               <a:buNone/>
               <a:defRPr sz="1000"/>
             </a:lvl4pPr>
-            <a:lvl5pPr marL="1828800" indent="0">
+            <a:lvl5pPr marL="1828796" indent="0">
               <a:buNone/>
               <a:defRPr sz="1000"/>
             </a:lvl5pPr>
-            <a:lvl6pPr marL="2286000" indent="0">
+            <a:lvl6pPr marL="2285996" indent="0">
               <a:buNone/>
               <a:defRPr sz="1000"/>
             </a:lvl6pPr>
-            <a:lvl7pPr marL="2743200" indent="0">
+            <a:lvl7pPr marL="2743194" indent="0">
               <a:buNone/>
               <a:defRPr sz="1000"/>
             </a:lvl7pPr>
-            <a:lvl8pPr marL="3200400" indent="0">
+            <a:lvl8pPr marL="3200394" indent="0">
               <a:buNone/>
               <a:defRPr sz="1000"/>
             </a:lvl8pPr>
-            <a:lvl9pPr marL="3657600" indent="0">
+            <a:lvl9pPr marL="3657592" indent="0">
               <a:buNone/>
               <a:defRPr sz="1000"/>
             </a:lvl9pPr>
@@ -2671,7 +2671,7 @@
           <a:p>
             <a:fld id="{001A219B-7441-422C-8DCF-B69CF4F9A207}" type="datetimeFigureOut">
               <a:rPr lang="en-US" smtClean="0"/>
-              <a:t>9/10/2020</a:t>
+              <a:t>9/11/2020</a:t>
             </a:fld>
             <a:endParaRPr lang="en-US"/>
           </a:p>
@@ -2784,7 +2784,7 @@
         </p:nvSpPr>
         <p:spPr>
           <a:xfrm>
-            <a:off x="838200" y="365125"/>
+            <a:off x="838201" y="365127"/>
             <a:ext cx="10515600" cy="1325563"/>
           </a:xfrm>
           <a:prstGeom prst="rect">
@@ -2822,7 +2822,7 @@
         </p:nvSpPr>
         <p:spPr>
           <a:xfrm>
-            <a:off x="838200" y="1825625"/>
+            <a:off x="838201" y="1825625"/>
             <a:ext cx="10515600" cy="4351338"/>
           </a:xfrm>
           <a:prstGeom prst="rect">
@@ -2889,7 +2889,7 @@
         </p:nvSpPr>
         <p:spPr>
           <a:xfrm>
-            <a:off x="838200" y="6356350"/>
+            <a:off x="838201" y="6356352"/>
             <a:ext cx="2743200" cy="365125"/>
           </a:xfrm>
           <a:prstGeom prst="rect">
@@ -2912,7 +2912,7 @@
           <a:p>
             <a:fld id="{001A219B-7441-422C-8DCF-B69CF4F9A207}" type="datetimeFigureOut">
               <a:rPr lang="en-US" smtClean="0"/>
-              <a:t>9/10/2020</a:t>
+              <a:t>9/11/2020</a:t>
             </a:fld>
             <a:endParaRPr lang="en-US"/>
           </a:p>
@@ -2936,7 +2936,7 @@
         </p:nvSpPr>
         <p:spPr>
           <a:xfrm>
-            <a:off x="4038600" y="6356350"/>
+            <a:off x="4038601" y="6356352"/>
             <a:ext cx="4114800" cy="365125"/>
           </a:xfrm>
           <a:prstGeom prst="rect">
@@ -2979,7 +2979,7 @@
         </p:nvSpPr>
         <p:spPr>
           <a:xfrm>
-            <a:off x="8610600" y="6356350"/>
+            <a:off x="8610600" y="6356352"/>
             <a:ext cx="2743200" cy="365125"/>
           </a:xfrm>
           <a:prstGeom prst="rect">
@@ -3031,7 +3031,7 @@
   </p:sldLayoutIdLst>
   <p:txStyles>
     <p:titleStyle>
-      <a:lvl1pPr algn="l" defTabSz="914400" rtl="0" eaLnBrk="1" latinLnBrk="0" hangingPunct="1">
+      <a:lvl1pPr algn="l" defTabSz="914398" rtl="0" eaLnBrk="1" latinLnBrk="0" hangingPunct="1">
         <a:lnSpc>
           <a:spcPct val="90000"/>
         </a:lnSpc>
@@ -3050,7 +3050,7 @@
       </a:lvl1pPr>
     </p:titleStyle>
     <p:bodyStyle>
-      <a:lvl1pPr marL="228600" indent="-228600" algn="l" defTabSz="914400" rtl="0" eaLnBrk="1" latinLnBrk="0" hangingPunct="1">
+      <a:lvl1pPr marL="228599" indent="-228599" algn="l" defTabSz="914398" rtl="0" eaLnBrk="1" latinLnBrk="0" hangingPunct="1">
         <a:lnSpc>
           <a:spcPct val="90000"/>
         </a:lnSpc>
@@ -3068,7 +3068,7 @@
           <a:cs typeface="+mn-cs"/>
         </a:defRPr>
       </a:lvl1pPr>
-      <a:lvl2pPr marL="685800" indent="-228600" algn="l" defTabSz="914400" rtl="0" eaLnBrk="1" latinLnBrk="0" hangingPunct="1">
+      <a:lvl2pPr marL="685799" indent="-228599" algn="l" defTabSz="914398" rtl="0" eaLnBrk="1" latinLnBrk="0" hangingPunct="1">
         <a:lnSpc>
           <a:spcPct val="90000"/>
         </a:lnSpc>
@@ -3086,7 +3086,7 @@
           <a:cs typeface="+mn-cs"/>
         </a:defRPr>
       </a:lvl2pPr>
-      <a:lvl3pPr marL="1143000" indent="-228600" algn="l" defTabSz="914400" rtl="0" eaLnBrk="1" latinLnBrk="0" hangingPunct="1">
+      <a:lvl3pPr marL="1142997" indent="-228599" algn="l" defTabSz="914398" rtl="0" eaLnBrk="1" latinLnBrk="0" hangingPunct="1">
         <a:lnSpc>
           <a:spcPct val="90000"/>
         </a:lnSpc>
@@ -3104,7 +3104,7 @@
           <a:cs typeface="+mn-cs"/>
         </a:defRPr>
       </a:lvl3pPr>
-      <a:lvl4pPr marL="1600200" indent="-228600" algn="l" defTabSz="914400" rtl="0" eaLnBrk="1" latinLnBrk="0" hangingPunct="1">
+      <a:lvl4pPr marL="1600197" indent="-228599" algn="l" defTabSz="914398" rtl="0" eaLnBrk="1" latinLnBrk="0" hangingPunct="1">
         <a:lnSpc>
           <a:spcPct val="90000"/>
         </a:lnSpc>
@@ -3122,7 +3122,7 @@
           <a:cs typeface="+mn-cs"/>
         </a:defRPr>
       </a:lvl4pPr>
-      <a:lvl5pPr marL="2057400" indent="-228600" algn="l" defTabSz="914400" rtl="0" eaLnBrk="1" latinLnBrk="0" hangingPunct="1">
+      <a:lvl5pPr marL="2057396" indent="-228599" algn="l" defTabSz="914398" rtl="0" eaLnBrk="1" latinLnBrk="0" hangingPunct="1">
         <a:lnSpc>
           <a:spcPct val="90000"/>
         </a:lnSpc>
@@ -3140,7 +3140,7 @@
           <a:cs typeface="+mn-cs"/>
         </a:defRPr>
       </a:lvl5pPr>
-      <a:lvl6pPr marL="2514600" indent="-228600" algn="l" defTabSz="914400" rtl="0" eaLnBrk="1" latinLnBrk="0" hangingPunct="1">
+      <a:lvl6pPr marL="2514595" indent="-228599" algn="l" defTabSz="914398" rtl="0" eaLnBrk="1" latinLnBrk="0" hangingPunct="1">
         <a:lnSpc>
           <a:spcPct val="90000"/>
         </a:lnSpc>
@@ -3158,7 +3158,7 @@
           <a:cs typeface="+mn-cs"/>
         </a:defRPr>
       </a:lvl6pPr>
-      <a:lvl7pPr marL="2971800" indent="-228600" algn="l" defTabSz="914400" rtl="0" eaLnBrk="1" latinLnBrk="0" hangingPunct="1">
+      <a:lvl7pPr marL="2971794" indent="-228599" algn="l" defTabSz="914398" rtl="0" eaLnBrk="1" latinLnBrk="0" hangingPunct="1">
         <a:lnSpc>
           <a:spcPct val="90000"/>
         </a:lnSpc>
@@ -3176,7 +3176,7 @@
           <a:cs typeface="+mn-cs"/>
         </a:defRPr>
       </a:lvl7pPr>
-      <a:lvl8pPr marL="3429000" indent="-228600" algn="l" defTabSz="914400" rtl="0" eaLnBrk="1" latinLnBrk="0" hangingPunct="1">
+      <a:lvl8pPr marL="3428993" indent="-228599" algn="l" defTabSz="914398" rtl="0" eaLnBrk="1" latinLnBrk="0" hangingPunct="1">
         <a:lnSpc>
           <a:spcPct val="90000"/>
         </a:lnSpc>
@@ -3194,7 +3194,7 @@
           <a:cs typeface="+mn-cs"/>
         </a:defRPr>
       </a:lvl8pPr>
-      <a:lvl9pPr marL="3886200" indent="-228600" algn="l" defTabSz="914400" rtl="0" eaLnBrk="1" latinLnBrk="0" hangingPunct="1">
+      <a:lvl9pPr marL="3886192" indent="-228599" algn="l" defTabSz="914398" rtl="0" eaLnBrk="1" latinLnBrk="0" hangingPunct="1">
         <a:lnSpc>
           <a:spcPct val="90000"/>
         </a:lnSpc>
@@ -3217,7 +3217,7 @@
       <a:defPPr>
         <a:defRPr lang="en-US"/>
       </a:defPPr>
-      <a:lvl1pPr marL="0" algn="l" defTabSz="914400" rtl="0" eaLnBrk="1" latinLnBrk="0" hangingPunct="1">
+      <a:lvl1pPr marL="0" algn="l" defTabSz="914398" rtl="0" eaLnBrk="1" latinLnBrk="0" hangingPunct="1">
         <a:defRPr sz="1800" kern="1200">
           <a:solidFill>
             <a:schemeClr val="tx1"/>
@@ -3227,7 +3227,7 @@
           <a:cs typeface="+mn-cs"/>
         </a:defRPr>
       </a:lvl1pPr>
-      <a:lvl2pPr marL="457200" algn="l" defTabSz="914400" rtl="0" eaLnBrk="1" latinLnBrk="0" hangingPunct="1">
+      <a:lvl2pPr marL="457199" algn="l" defTabSz="914398" rtl="0" eaLnBrk="1" latinLnBrk="0" hangingPunct="1">
         <a:defRPr sz="1800" kern="1200">
           <a:solidFill>
             <a:schemeClr val="tx1"/>
@@ -3237,7 +3237,7 @@
           <a:cs typeface="+mn-cs"/>
         </a:defRPr>
       </a:lvl2pPr>
-      <a:lvl3pPr marL="914400" algn="l" defTabSz="914400" rtl="0" eaLnBrk="1" latinLnBrk="0" hangingPunct="1">
+      <a:lvl3pPr marL="914398" algn="l" defTabSz="914398" rtl="0" eaLnBrk="1" latinLnBrk="0" hangingPunct="1">
         <a:defRPr sz="1800" kern="1200">
           <a:solidFill>
             <a:schemeClr val="tx1"/>
@@ -3247,7 +3247,7 @@
           <a:cs typeface="+mn-cs"/>
         </a:defRPr>
       </a:lvl3pPr>
-      <a:lvl4pPr marL="1371600" algn="l" defTabSz="914400" rtl="0" eaLnBrk="1" latinLnBrk="0" hangingPunct="1">
+      <a:lvl4pPr marL="1371597" algn="l" defTabSz="914398" rtl="0" eaLnBrk="1" latinLnBrk="0" hangingPunct="1">
         <a:defRPr sz="1800" kern="1200">
           <a:solidFill>
             <a:schemeClr val="tx1"/>
@@ -3257,7 +3257,7 @@
           <a:cs typeface="+mn-cs"/>
         </a:defRPr>
       </a:lvl4pPr>
-      <a:lvl5pPr marL="1828800" algn="l" defTabSz="914400" rtl="0" eaLnBrk="1" latinLnBrk="0" hangingPunct="1">
+      <a:lvl5pPr marL="1828796" algn="l" defTabSz="914398" rtl="0" eaLnBrk="1" latinLnBrk="0" hangingPunct="1">
         <a:defRPr sz="1800" kern="1200">
           <a:solidFill>
             <a:schemeClr val="tx1"/>
@@ -3267,7 +3267,7 @@
           <a:cs typeface="+mn-cs"/>
         </a:defRPr>
       </a:lvl5pPr>
-      <a:lvl6pPr marL="2286000" algn="l" defTabSz="914400" rtl="0" eaLnBrk="1" latinLnBrk="0" hangingPunct="1">
+      <a:lvl6pPr marL="2285996" algn="l" defTabSz="914398" rtl="0" eaLnBrk="1" latinLnBrk="0" hangingPunct="1">
         <a:defRPr sz="1800" kern="1200">
           <a:solidFill>
             <a:schemeClr val="tx1"/>
@@ -3277,7 +3277,7 @@
           <a:cs typeface="+mn-cs"/>
         </a:defRPr>
       </a:lvl6pPr>
-      <a:lvl7pPr marL="2743200" algn="l" defTabSz="914400" rtl="0" eaLnBrk="1" latinLnBrk="0" hangingPunct="1">
+      <a:lvl7pPr marL="2743194" algn="l" defTabSz="914398" rtl="0" eaLnBrk="1" latinLnBrk="0" hangingPunct="1">
         <a:defRPr sz="1800" kern="1200">
           <a:solidFill>
             <a:schemeClr val="tx1"/>
@@ -3287,7 +3287,7 @@
           <a:cs typeface="+mn-cs"/>
         </a:defRPr>
       </a:lvl7pPr>
-      <a:lvl8pPr marL="3200400" algn="l" defTabSz="914400" rtl="0" eaLnBrk="1" latinLnBrk="0" hangingPunct="1">
+      <a:lvl8pPr marL="3200394" algn="l" defTabSz="914398" rtl="0" eaLnBrk="1" latinLnBrk="0" hangingPunct="1">
         <a:defRPr sz="1800" kern="1200">
           <a:solidFill>
             <a:schemeClr val="tx1"/>
@@ -3297,7 +3297,7 @@
           <a:cs typeface="+mn-cs"/>
         </a:defRPr>
       </a:lvl8pPr>
-      <a:lvl9pPr marL="3657600" algn="l" defTabSz="914400" rtl="0" eaLnBrk="1" latinLnBrk="0" hangingPunct="1">
+      <a:lvl9pPr marL="3657592" algn="l" defTabSz="914398" rtl="0" eaLnBrk="1" latinLnBrk="0" hangingPunct="1">
         <a:defRPr sz="1800" kern="1200">
           <a:solidFill>
             <a:schemeClr val="tx1"/>
@@ -3351,7 +3351,7 @@
         </p:blipFill>
         <p:spPr>
           <a:xfrm>
-            <a:off x="2193604" y="923108"/>
+            <a:off x="2193604" y="923110"/>
             <a:ext cx="4749068" cy="5011783"/>
           </a:xfrm>
           <a:prstGeom prst="rect">
@@ -3373,7 +3373,7 @@
         </p:nvSpPr>
         <p:spPr>
           <a:xfrm>
-            <a:off x="1955984" y="2706257"/>
+            <a:off x="1955986" y="2706259"/>
             <a:ext cx="1217757" cy="446887"/>
           </a:xfrm>
           <a:prstGeom prst="rect">
@@ -3441,7 +3441,7 @@
         </p:nvSpPr>
         <p:spPr>
           <a:xfrm>
-            <a:off x="6577257" y="2856077"/>
+            <a:off x="6577257" y="2856079"/>
             <a:ext cx="1502818" cy="446887"/>
           </a:xfrm>
           <a:prstGeom prst="rect">
@@ -3509,7 +3509,7 @@
         </p:nvSpPr>
         <p:spPr>
           <a:xfrm>
-            <a:off x="6274629" y="5191826"/>
+            <a:off x="6274632" y="5191828"/>
             <a:ext cx="1414381" cy="446887"/>
           </a:xfrm>
           <a:prstGeom prst="rect">
@@ -3577,7 +3577,7 @@
         </p:nvSpPr>
         <p:spPr>
           <a:xfrm>
-            <a:off x="2062975" y="2268574"/>
+            <a:off x="2062977" y="2268576"/>
             <a:ext cx="261257" cy="261257"/>
           </a:xfrm>
           <a:prstGeom prst="ellipse">
@@ -3645,7 +3645,7 @@
         </p:nvSpPr>
         <p:spPr>
           <a:xfrm>
-            <a:off x="6446628" y="2445000"/>
+            <a:off x="6446631" y="2445003"/>
             <a:ext cx="261257" cy="261257"/>
           </a:xfrm>
           <a:prstGeom prst="ellipse">
@@ -3713,7 +3713,7 @@
         </p:nvSpPr>
         <p:spPr>
           <a:xfrm>
-            <a:off x="6446627" y="4814067"/>
+            <a:off x="6446630" y="4814070"/>
             <a:ext cx="261257" cy="261257"/>
           </a:xfrm>
           <a:prstGeom prst="ellipse">
@@ -3824,7 +3824,7 @@
         </p:blipFill>
         <p:spPr>
           <a:xfrm>
-            <a:off x="2193604" y="918373"/>
+            <a:off x="2193604" y="918375"/>
             <a:ext cx="4749068" cy="4319631"/>
           </a:xfrm>
           <a:prstGeom prst="rect">
@@ -3846,7 +3846,7 @@
         </p:nvSpPr>
         <p:spPr>
           <a:xfrm>
-            <a:off x="1955984" y="2706257"/>
+            <a:off x="1955986" y="2706259"/>
             <a:ext cx="1217757" cy="446887"/>
           </a:xfrm>
           <a:prstGeom prst="rect">
@@ -3914,7 +3914,7 @@
         </p:nvSpPr>
         <p:spPr>
           <a:xfrm>
-            <a:off x="6577257" y="2856077"/>
+            <a:off x="6577257" y="2856079"/>
             <a:ext cx="1502818" cy="446887"/>
           </a:xfrm>
           <a:prstGeom prst="rect">
@@ -3982,7 +3982,7 @@
         </p:nvSpPr>
         <p:spPr>
           <a:xfrm>
-            <a:off x="6274629" y="4656983"/>
+            <a:off x="6274632" y="4656986"/>
             <a:ext cx="1414381" cy="446887"/>
           </a:xfrm>
           <a:prstGeom prst="rect">
@@ -4050,7 +4050,7 @@
         </p:nvSpPr>
         <p:spPr>
           <a:xfrm>
-            <a:off x="2062975" y="2268574"/>
+            <a:off x="2062977" y="2268576"/>
             <a:ext cx="261257" cy="261257"/>
           </a:xfrm>
           <a:prstGeom prst="ellipse">
@@ -4118,7 +4118,7 @@
         </p:nvSpPr>
         <p:spPr>
           <a:xfrm>
-            <a:off x="6446628" y="2445000"/>
+            <a:off x="6446631" y="2445003"/>
             <a:ext cx="261257" cy="261257"/>
           </a:xfrm>
           <a:prstGeom prst="ellipse">
@@ -4186,7 +4186,7 @@
         </p:nvSpPr>
         <p:spPr>
           <a:xfrm>
-            <a:off x="6446627" y="4279224"/>
+            <a:off x="6446630" y="4279227"/>
             <a:ext cx="261257" cy="261257"/>
           </a:xfrm>
           <a:prstGeom prst="ellipse">
@@ -4284,7 +4284,7 @@
         </p:nvSpPr>
         <p:spPr>
           <a:xfrm rot="16200000" flipV="1">
-            <a:off x="3445742" y="3560255"/>
+            <a:off x="3445744" y="3560255"/>
             <a:ext cx="1539175" cy="435798"/>
           </a:xfrm>
           <a:prstGeom prst="parallelogram">
@@ -4345,7 +4345,7 @@
         </p:nvCxnSpPr>
         <p:spPr>
           <a:xfrm>
-            <a:off x="3059502" y="3398627"/>
+            <a:off x="3059502" y="3398629"/>
             <a:ext cx="0" cy="1145743"/>
           </a:xfrm>
           <a:prstGeom prst="line">
@@ -4390,7 +4390,7 @@
         </p:nvCxnSpPr>
         <p:spPr>
           <a:xfrm flipH="1">
-            <a:off x="3059503" y="4544370"/>
+            <a:off x="3059505" y="4544370"/>
             <a:ext cx="1780629" cy="0"/>
           </a:xfrm>
           <a:prstGeom prst="line">
@@ -4435,7 +4435,7 @@
         </p:nvCxnSpPr>
         <p:spPr>
           <a:xfrm flipH="1">
-            <a:off x="3059502" y="3863856"/>
+            <a:off x="3059505" y="3863856"/>
             <a:ext cx="535255" cy="680514"/>
           </a:xfrm>
           <a:prstGeom prst="line">
@@ -4478,7 +4478,7 @@
         </p:nvSpPr>
         <p:spPr>
           <a:xfrm>
-            <a:off x="3298639" y="3525828"/>
+            <a:off x="3298642" y="3525830"/>
             <a:ext cx="632509" cy="307777"/>
           </a:xfrm>
           <a:prstGeom prst="rect">
@@ -4516,7 +4516,7 @@
         </p:nvSpPr>
         <p:spPr>
           <a:xfrm>
-            <a:off x="2623679" y="3111883"/>
+            <a:off x="2623679" y="3111885"/>
             <a:ext cx="871646" cy="307777"/>
           </a:xfrm>
           <a:prstGeom prst="rect">
@@ -4554,7 +4554,7 @@
         </p:nvSpPr>
         <p:spPr>
           <a:xfrm>
-            <a:off x="4404309" y="4574622"/>
+            <a:off x="4404309" y="4574624"/>
             <a:ext cx="871646" cy="307777"/>
           </a:xfrm>
           <a:prstGeom prst="rect">
@@ -4592,7 +4592,7 @@
         </p:nvSpPr>
         <p:spPr>
           <a:xfrm>
-            <a:off x="3780171" y="4574622"/>
+            <a:off x="3780171" y="4574625"/>
             <a:ext cx="871646" cy="307777"/>
           </a:xfrm>
           <a:prstGeom prst="rect">
@@ -4630,7 +4630,7 @@
         </p:nvSpPr>
         <p:spPr>
           <a:xfrm>
-            <a:off x="2557396" y="3831234"/>
+            <a:off x="2557396" y="3831236"/>
             <a:ext cx="871646" cy="307777"/>
           </a:xfrm>
           <a:prstGeom prst="rect">
@@ -4677,7 +4677,7 @@
         </p:nvCxnSpPr>
         <p:spPr>
           <a:xfrm flipH="1">
-            <a:off x="3997431" y="3450285"/>
+            <a:off x="3997432" y="3450288"/>
             <a:ext cx="435798" cy="554067"/>
           </a:xfrm>
           <a:prstGeom prst="line">
@@ -4812,7 +4812,7 @@
         </p:nvSpPr>
         <p:spPr>
           <a:xfrm rot="16200000" flipV="1">
-            <a:off x="6434603" y="2968182"/>
+            <a:off x="6434605" y="2968182"/>
             <a:ext cx="824383" cy="1649160"/>
           </a:xfrm>
           <a:prstGeom prst="parallelogram">
@@ -4873,7 +4873,7 @@
         </p:nvCxnSpPr>
         <p:spPr>
           <a:xfrm>
-            <a:off x="5757392" y="3395255"/>
+            <a:off x="5757392" y="3395257"/>
             <a:ext cx="0" cy="1145743"/>
           </a:xfrm>
           <a:prstGeom prst="line">
@@ -4918,7 +4918,7 @@
         </p:nvCxnSpPr>
         <p:spPr>
           <a:xfrm flipH="1">
-            <a:off x="5757393" y="4540998"/>
+            <a:off x="5757395" y="4540998"/>
             <a:ext cx="1780629" cy="0"/>
           </a:xfrm>
           <a:prstGeom prst="line">
@@ -4963,7 +4963,7 @@
         </p:nvCxnSpPr>
         <p:spPr>
           <a:xfrm flipH="1">
-            <a:off x="5757392" y="3860484"/>
+            <a:off x="5757395" y="3860484"/>
             <a:ext cx="535255" cy="680514"/>
           </a:xfrm>
           <a:prstGeom prst="line">
@@ -5006,7 +5006,7 @@
         </p:nvSpPr>
         <p:spPr>
           <a:xfrm>
-            <a:off x="6273773" y="3772548"/>
+            <a:off x="6273776" y="3772550"/>
             <a:ext cx="632509" cy="307777"/>
           </a:xfrm>
           <a:prstGeom prst="rect">
@@ -5044,7 +5044,7 @@
         </p:nvSpPr>
         <p:spPr>
           <a:xfrm>
-            <a:off x="5321569" y="3108511"/>
+            <a:off x="5321569" y="3108513"/>
             <a:ext cx="871646" cy="307777"/>
           </a:xfrm>
           <a:prstGeom prst="rect">
@@ -5082,7 +5082,7 @@
         </p:nvSpPr>
         <p:spPr>
           <a:xfrm>
-            <a:off x="7102199" y="4571250"/>
+            <a:off x="7102199" y="4571252"/>
             <a:ext cx="871646" cy="307777"/>
           </a:xfrm>
           <a:prstGeom prst="rect">
@@ -5120,7 +5120,7 @@
         </p:nvSpPr>
         <p:spPr>
           <a:xfrm>
-            <a:off x="5978699" y="4168261"/>
+            <a:off x="5978699" y="4168264"/>
             <a:ext cx="871646" cy="307777"/>
           </a:xfrm>
           <a:prstGeom prst="rect">
@@ -5158,7 +5158,7 @@
         </p:nvSpPr>
         <p:spPr>
           <a:xfrm>
-            <a:off x="5255286" y="3827862"/>
+            <a:off x="5255286" y="3827865"/>
             <a:ext cx="871646" cy="307777"/>
           </a:xfrm>
           <a:prstGeom prst="rect">
@@ -5205,7 +5205,7 @@
         </p:nvCxnSpPr>
         <p:spPr>
           <a:xfrm flipH="1">
-            <a:off x="6022213" y="3768380"/>
+            <a:off x="6022216" y="3768380"/>
             <a:ext cx="1649161" cy="0"/>
           </a:xfrm>
           <a:prstGeom prst="line">
@@ -5370,7 +5370,7 @@
         </p:nvSpPr>
         <p:spPr>
           <a:xfrm>
-            <a:off x="1840020" y="2027420"/>
+            <a:off x="1840022" y="2027422"/>
             <a:ext cx="102767" cy="102767"/>
           </a:xfrm>
           <a:prstGeom prst="ellipse">
@@ -5425,7 +5425,7 @@
         </p:nvSpPr>
         <p:spPr>
           <a:xfrm>
-            <a:off x="1468254" y="1741673"/>
+            <a:off x="1468254" y="1741675"/>
             <a:ext cx="743532" cy="276999"/>
           </a:xfrm>
           <a:prstGeom prst="rect">
@@ -5463,7 +5463,7 @@
         </p:nvSpPr>
         <p:spPr>
           <a:xfrm>
-            <a:off x="3180277" y="1303481"/>
+            <a:off x="3180279" y="1303483"/>
             <a:ext cx="102767" cy="102767"/>
           </a:xfrm>
           <a:prstGeom prst="ellipse">
@@ -5518,7 +5518,7 @@
         </p:nvSpPr>
         <p:spPr>
           <a:xfrm>
-            <a:off x="3180048" y="2027421"/>
+            <a:off x="3180050" y="2027423"/>
             <a:ext cx="102767" cy="102767"/>
           </a:xfrm>
           <a:prstGeom prst="ellipse">
@@ -5573,7 +5573,7 @@
         </p:nvSpPr>
         <p:spPr>
           <a:xfrm>
-            <a:off x="3180047" y="2751361"/>
+            <a:off x="3180050" y="2751363"/>
             <a:ext cx="102767" cy="102767"/>
           </a:xfrm>
           <a:prstGeom prst="ellipse">
@@ -5628,7 +5628,7 @@
         </p:nvSpPr>
         <p:spPr>
           <a:xfrm>
-            <a:off x="2646825" y="1037811"/>
+            <a:off x="2646825" y="1037813"/>
             <a:ext cx="1169210" cy="276999"/>
           </a:xfrm>
           <a:prstGeom prst="rect">
@@ -5667,7 +5667,7 @@
         </p:nvSpPr>
         <p:spPr>
           <a:xfrm>
-            <a:off x="4520076" y="2027420"/>
+            <a:off x="4520078" y="2027423"/>
             <a:ext cx="102767" cy="102767"/>
           </a:xfrm>
           <a:prstGeom prst="ellipse">
@@ -5722,7 +5722,7 @@
         </p:nvSpPr>
         <p:spPr>
           <a:xfrm>
-            <a:off x="3917658" y="1784308"/>
+            <a:off x="3917661" y="1784311"/>
             <a:ext cx="2051295" cy="276999"/>
           </a:xfrm>
           <a:prstGeom prst="rect">
@@ -5764,7 +5764,7 @@
         </p:nvSpPr>
         <p:spPr>
           <a:xfrm>
-            <a:off x="2680168" y="1784309"/>
+            <a:off x="2680169" y="1784312"/>
             <a:ext cx="1102756" cy="276999"/>
           </a:xfrm>
           <a:prstGeom prst="rect">
@@ -5803,7 +5803,7 @@
         </p:nvSpPr>
         <p:spPr>
           <a:xfrm>
-            <a:off x="3385581" y="2664246"/>
+            <a:off x="3385583" y="2664249"/>
             <a:ext cx="1066501" cy="276999"/>
           </a:xfrm>
           <a:prstGeom prst="rect">
@@ -5846,7 +5846,7 @@
         </p:nvCxnSpPr>
         <p:spPr>
           <a:xfrm>
-            <a:off x="1942787" y="2078804"/>
+            <a:off x="1942787" y="2078806"/>
             <a:ext cx="1237260" cy="723941"/>
           </a:xfrm>
           <a:prstGeom prst="straightConnector1">
@@ -5894,7 +5894,7 @@
         </p:nvCxnSpPr>
         <p:spPr>
           <a:xfrm>
-            <a:off x="1942787" y="2078804"/>
+            <a:off x="1942789" y="2078806"/>
             <a:ext cx="1237261" cy="1"/>
           </a:xfrm>
           <a:prstGeom prst="straightConnector1">
@@ -5942,7 +5942,7 @@
         </p:nvCxnSpPr>
         <p:spPr>
           <a:xfrm flipV="1">
-            <a:off x="1942787" y="1354865"/>
+            <a:off x="1942787" y="1354867"/>
             <a:ext cx="1237490" cy="723939"/>
           </a:xfrm>
           <a:prstGeom prst="straightConnector1">
@@ -5991,7 +5991,7 @@
         </p:nvCxnSpPr>
         <p:spPr>
           <a:xfrm flipV="1">
-            <a:off x="3282814" y="2078804"/>
+            <a:off x="3282814" y="2078807"/>
             <a:ext cx="1237262" cy="723941"/>
           </a:xfrm>
           <a:prstGeom prst="straightConnector1">
@@ -6039,7 +6039,7 @@
         </p:nvCxnSpPr>
         <p:spPr>
           <a:xfrm flipV="1">
-            <a:off x="3282815" y="2078804"/>
+            <a:off x="3282817" y="2078806"/>
             <a:ext cx="1237261" cy="1"/>
           </a:xfrm>
           <a:prstGeom prst="straightConnector1">
@@ -6087,7 +6087,7 @@
         </p:nvCxnSpPr>
         <p:spPr>
           <a:xfrm flipV="1">
-            <a:off x="3283044" y="1353423"/>
+            <a:off x="3283047" y="1353424"/>
             <a:ext cx="1237031" cy="1442"/>
           </a:xfrm>
           <a:prstGeom prst="straightConnector1">
@@ -6132,7 +6132,7 @@
         </p:nvSpPr>
         <p:spPr>
           <a:xfrm>
-            <a:off x="4520075" y="1302039"/>
+            <a:off x="4520078" y="1302042"/>
             <a:ext cx="102767" cy="102767"/>
           </a:xfrm>
           <a:prstGeom prst="ellipse">
@@ -6187,7 +6187,7 @@
         </p:nvSpPr>
         <p:spPr>
           <a:xfrm>
-            <a:off x="4111498" y="1032968"/>
+            <a:off x="4111501" y="1032970"/>
             <a:ext cx="1494981" cy="276999"/>
           </a:xfrm>
           <a:prstGeom prst="rect">
@@ -6225,7 +6225,7 @@
         </p:nvSpPr>
         <p:spPr>
           <a:xfrm>
-            <a:off x="2077292" y="2078803"/>
+            <a:off x="2077292" y="2078805"/>
             <a:ext cx="1102756" cy="276999"/>
           </a:xfrm>
           <a:prstGeom prst="rect">
@@ -6264,7 +6264,7 @@
         </p:nvSpPr>
         <p:spPr>
           <a:xfrm>
-            <a:off x="3173966" y="2078803"/>
+            <a:off x="3173966" y="2078806"/>
             <a:ext cx="1102756" cy="276999"/>
           </a:xfrm>
           <a:prstGeom prst="rect">

</xml_diff>

<commit_message>
Providers, merge design and motivation
</commit_message>
<xml_diff>
--- a/wip-design/figures/thegamma.pptx
+++ b/wip-design/figures/thegamma.pptx
@@ -7,8 +7,9 @@
   <p:sldIdLst>
     <p:sldId id="256" r:id="rId2"/>
     <p:sldId id="259" r:id="rId3"/>
-    <p:sldId id="257" r:id="rId4"/>
-    <p:sldId id="258" r:id="rId5"/>
+    <p:sldId id="260" r:id="rId4"/>
+    <p:sldId id="257" r:id="rId5"/>
+    <p:sldId id="258" r:id="rId6"/>
   </p:sldIdLst>
   <p:sldSz cx="12192000" cy="6858000"/>
   <p:notesSz cx="6858000" cy="9144000"/>
@@ -262,7 +263,7 @@
           <a:p>
             <a:fld id="{001A219B-7441-422C-8DCF-B69CF4F9A207}" type="datetimeFigureOut">
               <a:rPr lang="en-US" smtClean="0"/>
-              <a:t>9/11/2020</a:t>
+              <a:t>9/12/2020</a:t>
             </a:fld>
             <a:endParaRPr lang="en-US"/>
           </a:p>
@@ -460,7 +461,7 @@
           <a:p>
             <a:fld id="{001A219B-7441-422C-8DCF-B69CF4F9A207}" type="datetimeFigureOut">
               <a:rPr lang="en-US" smtClean="0"/>
-              <a:t>9/11/2020</a:t>
+              <a:t>9/12/2020</a:t>
             </a:fld>
             <a:endParaRPr lang="en-US"/>
           </a:p>
@@ -668,7 +669,7 @@
           <a:p>
             <a:fld id="{001A219B-7441-422C-8DCF-B69CF4F9A207}" type="datetimeFigureOut">
               <a:rPr lang="en-US" smtClean="0"/>
-              <a:t>9/11/2020</a:t>
+              <a:t>9/12/2020</a:t>
             </a:fld>
             <a:endParaRPr lang="en-US"/>
           </a:p>
@@ -866,7 +867,7 @@
           <a:p>
             <a:fld id="{001A219B-7441-422C-8DCF-B69CF4F9A207}" type="datetimeFigureOut">
               <a:rPr lang="en-US" smtClean="0"/>
-              <a:t>9/11/2020</a:t>
+              <a:t>9/12/2020</a:t>
             </a:fld>
             <a:endParaRPr lang="en-US"/>
           </a:p>
@@ -1141,7 +1142,7 @@
           <a:p>
             <a:fld id="{001A219B-7441-422C-8DCF-B69CF4F9A207}" type="datetimeFigureOut">
               <a:rPr lang="en-US" smtClean="0"/>
-              <a:t>9/11/2020</a:t>
+              <a:t>9/12/2020</a:t>
             </a:fld>
             <a:endParaRPr lang="en-US"/>
           </a:p>
@@ -1406,7 +1407,7 @@
           <a:p>
             <a:fld id="{001A219B-7441-422C-8DCF-B69CF4F9A207}" type="datetimeFigureOut">
               <a:rPr lang="en-US" smtClean="0"/>
-              <a:t>9/11/2020</a:t>
+              <a:t>9/12/2020</a:t>
             </a:fld>
             <a:endParaRPr lang="en-US"/>
           </a:p>
@@ -1818,7 +1819,7 @@
           <a:p>
             <a:fld id="{001A219B-7441-422C-8DCF-B69CF4F9A207}" type="datetimeFigureOut">
               <a:rPr lang="en-US" smtClean="0"/>
-              <a:t>9/11/2020</a:t>
+              <a:t>9/12/2020</a:t>
             </a:fld>
             <a:endParaRPr lang="en-US"/>
           </a:p>
@@ -1959,7 +1960,7 @@
           <a:p>
             <a:fld id="{001A219B-7441-422C-8DCF-B69CF4F9A207}" type="datetimeFigureOut">
               <a:rPr lang="en-US" smtClean="0"/>
-              <a:t>9/11/2020</a:t>
+              <a:t>9/12/2020</a:t>
             </a:fld>
             <a:endParaRPr lang="en-US"/>
           </a:p>
@@ -2072,7 +2073,7 @@
           <a:p>
             <a:fld id="{001A219B-7441-422C-8DCF-B69CF4F9A207}" type="datetimeFigureOut">
               <a:rPr lang="en-US" smtClean="0"/>
-              <a:t>9/11/2020</a:t>
+              <a:t>9/12/2020</a:t>
             </a:fld>
             <a:endParaRPr lang="en-US"/>
           </a:p>
@@ -2383,7 +2384,7 @@
           <a:p>
             <a:fld id="{001A219B-7441-422C-8DCF-B69CF4F9A207}" type="datetimeFigureOut">
               <a:rPr lang="en-US" smtClean="0"/>
-              <a:t>9/11/2020</a:t>
+              <a:t>9/12/2020</a:t>
             </a:fld>
             <a:endParaRPr lang="en-US"/>
           </a:p>
@@ -2671,7 +2672,7 @@
           <a:p>
             <a:fld id="{001A219B-7441-422C-8DCF-B69CF4F9A207}" type="datetimeFigureOut">
               <a:rPr lang="en-US" smtClean="0"/>
-              <a:t>9/11/2020</a:t>
+              <a:t>9/12/2020</a:t>
             </a:fld>
             <a:endParaRPr lang="en-US"/>
           </a:p>
@@ -2912,7 +2913,7 @@
           <a:p>
             <a:fld id="{001A219B-7441-422C-8DCF-B69CF4F9A207}" type="datetimeFigureOut">
               <a:rPr lang="en-US" smtClean="0"/>
-              <a:t>9/11/2020</a:t>
+              <a:t>9/12/2020</a:t>
             </a:fld>
             <a:endParaRPr lang="en-US"/>
           </a:p>
@@ -4270,6 +4271,479 @@
           <a:chExt cx="0" cy="0"/>
         </a:xfrm>
       </p:grpSpPr>
+      <p:pic>
+        <p:nvPicPr>
+          <p:cNvPr id="3" name="Picture 2">
+            <a:extLst>
+              <a:ext uri="{FF2B5EF4-FFF2-40B4-BE49-F238E27FC236}">
+                <a16:creationId xmlns:a16="http://schemas.microsoft.com/office/drawing/2014/main" id="{9C2C74CA-96DD-4B13-A346-B481A8C55BD2}"/>
+              </a:ext>
+            </a:extLst>
+          </p:cNvPr>
+          <p:cNvPicPr>
+            <a:picLocks noChangeAspect="1"/>
+          </p:cNvPicPr>
+          <p:nvPr/>
+        </p:nvPicPr>
+        <p:blipFill>
+          <a:blip r:embed="rId2">
+            <a:extLst>
+              <a:ext uri="{28A0092B-C50C-407E-A947-70E740481C1C}">
+                <a14:useLocalDpi xmlns:a14="http://schemas.microsoft.com/office/drawing/2010/main" val="0"/>
+              </a:ext>
+            </a:extLst>
+          </a:blip>
+          <a:srcRect/>
+          <a:stretch/>
+        </p:blipFill>
+        <p:spPr>
+          <a:xfrm>
+            <a:off x="2193605" y="1086073"/>
+            <a:ext cx="6144123" cy="4019714"/>
+          </a:xfrm>
+          <a:prstGeom prst="rect">
+            <a:avLst/>
+          </a:prstGeom>
+        </p:spPr>
+      </p:pic>
+      <p:sp>
+        <p:nvSpPr>
+          <p:cNvPr id="7" name="Rectangle 6">
+            <a:extLst>
+              <a:ext uri="{FF2B5EF4-FFF2-40B4-BE49-F238E27FC236}">
+                <a16:creationId xmlns:a16="http://schemas.microsoft.com/office/drawing/2014/main" id="{C8F87FA0-A4FF-4DE1-BE71-F8C7DA45196E}"/>
+              </a:ext>
+            </a:extLst>
+          </p:cNvPr>
+          <p:cNvSpPr/>
+          <p:nvPr/>
+        </p:nvSpPr>
+        <p:spPr>
+          <a:xfrm>
+            <a:off x="1955986" y="2706259"/>
+            <a:ext cx="1217757" cy="446887"/>
+          </a:xfrm>
+          <a:prstGeom prst="rect">
+            <a:avLst/>
+          </a:prstGeom>
+          <a:solidFill>
+            <a:schemeClr val="bg1"/>
+          </a:solidFill>
+          <a:ln>
+            <a:solidFill>
+              <a:schemeClr val="tx1"/>
+            </a:solidFill>
+          </a:ln>
+          <a:effectLst>
+            <a:outerShdw blurRad="50800" dist="12700" dir="2700000" algn="tl" rotWithShape="0">
+              <a:prstClr val="black">
+                <a:alpha val="40000"/>
+              </a:prstClr>
+            </a:outerShdw>
+          </a:effectLst>
+        </p:spPr>
+        <p:style>
+          <a:lnRef idx="2">
+            <a:schemeClr val="accent1">
+              <a:shade val="50000"/>
+            </a:schemeClr>
+          </a:lnRef>
+          <a:fillRef idx="1">
+            <a:schemeClr val="accent1"/>
+          </a:fillRef>
+          <a:effectRef idx="0">
+            <a:schemeClr val="accent1"/>
+          </a:effectRef>
+          <a:fontRef idx="minor">
+            <a:schemeClr val="lt1"/>
+          </a:fontRef>
+        </p:style>
+        <p:txBody>
+          <a:bodyPr rtlCol="0" anchor="ctr"/>
+          <a:lstStyle/>
+          <a:p>
+            <a:pPr algn="ctr"/>
+            <a:r>
+              <a:rPr lang="en-US" sz="1200" dirty="0">
+                <a:solidFill>
+                  <a:schemeClr val="tx1"/>
+                </a:solidFill>
+              </a:rPr>
+              <a:t>Full source code in a text editor</a:t>
+            </a:r>
+          </a:p>
+        </p:txBody>
+      </p:sp>
+      <p:sp>
+        <p:nvSpPr>
+          <p:cNvPr id="8" name="Rectangle 7">
+            <a:extLst>
+              <a:ext uri="{FF2B5EF4-FFF2-40B4-BE49-F238E27FC236}">
+                <a16:creationId xmlns:a16="http://schemas.microsoft.com/office/drawing/2014/main" id="{DFBF1C95-D3BF-4B70-8591-5523F32E3968}"/>
+              </a:ext>
+            </a:extLst>
+          </p:cNvPr>
+          <p:cNvSpPr/>
+          <p:nvPr/>
+        </p:nvSpPr>
+        <p:spPr>
+          <a:xfrm>
+            <a:off x="7140849" y="1754443"/>
+            <a:ext cx="1502818" cy="446887"/>
+          </a:xfrm>
+          <a:prstGeom prst="rect">
+            <a:avLst/>
+          </a:prstGeom>
+          <a:solidFill>
+            <a:schemeClr val="bg1"/>
+          </a:solidFill>
+          <a:ln>
+            <a:solidFill>
+              <a:schemeClr val="tx1"/>
+            </a:solidFill>
+          </a:ln>
+          <a:effectLst>
+            <a:outerShdw blurRad="50800" dist="12700" dir="2700000" algn="tl" rotWithShape="0">
+              <a:prstClr val="black">
+                <a:alpha val="40000"/>
+              </a:prstClr>
+            </a:outerShdw>
+          </a:effectLst>
+        </p:spPr>
+        <p:style>
+          <a:lnRef idx="2">
+            <a:schemeClr val="accent1">
+              <a:shade val="50000"/>
+            </a:schemeClr>
+          </a:lnRef>
+          <a:fillRef idx="1">
+            <a:schemeClr val="accent1"/>
+          </a:fillRef>
+          <a:effectRef idx="0">
+            <a:schemeClr val="accent1"/>
+          </a:effectRef>
+          <a:fontRef idx="minor">
+            <a:schemeClr val="lt1"/>
+          </a:fontRef>
+        </p:style>
+        <p:txBody>
+          <a:bodyPr rtlCol="0" anchor="ctr"/>
+          <a:lstStyle/>
+          <a:p>
+            <a:pPr algn="ctr"/>
+            <a:r>
+              <a:rPr lang="en-US" sz="1200" dirty="0">
+                <a:solidFill>
+                  <a:schemeClr val="tx1"/>
+                </a:solidFill>
+              </a:rPr>
+              <a:t>Programming via iterative prompting</a:t>
+            </a:r>
+          </a:p>
+        </p:txBody>
+      </p:sp>
+      <p:sp>
+        <p:nvSpPr>
+          <p:cNvPr id="9" name="Rectangle 8">
+            <a:extLst>
+              <a:ext uri="{FF2B5EF4-FFF2-40B4-BE49-F238E27FC236}">
+                <a16:creationId xmlns:a16="http://schemas.microsoft.com/office/drawing/2014/main" id="{0C74CD99-868C-403B-9A37-2273A8CEB96B}"/>
+              </a:ext>
+            </a:extLst>
+          </p:cNvPr>
+          <p:cNvSpPr/>
+          <p:nvPr/>
+        </p:nvSpPr>
+        <p:spPr>
+          <a:xfrm>
+            <a:off x="6697722" y="4786996"/>
+            <a:ext cx="1414381" cy="446887"/>
+          </a:xfrm>
+          <a:prstGeom prst="rect">
+            <a:avLst/>
+          </a:prstGeom>
+          <a:solidFill>
+            <a:schemeClr val="bg1"/>
+          </a:solidFill>
+          <a:ln>
+            <a:solidFill>
+              <a:schemeClr val="tx1"/>
+            </a:solidFill>
+          </a:ln>
+          <a:effectLst>
+            <a:outerShdw blurRad="50800" dist="12700" dir="2700000" algn="tl" rotWithShape="0">
+              <a:prstClr val="black">
+                <a:alpha val="40000"/>
+              </a:prstClr>
+            </a:outerShdw>
+          </a:effectLst>
+        </p:spPr>
+        <p:style>
+          <a:lnRef idx="2">
+            <a:schemeClr val="accent1">
+              <a:shade val="50000"/>
+            </a:schemeClr>
+          </a:lnRef>
+          <a:fillRef idx="1">
+            <a:schemeClr val="accent1"/>
+          </a:fillRef>
+          <a:effectRef idx="0">
+            <a:schemeClr val="accent1"/>
+          </a:effectRef>
+          <a:fontRef idx="minor">
+            <a:schemeClr val="lt1"/>
+          </a:fontRef>
+        </p:style>
+        <p:txBody>
+          <a:bodyPr rtlCol="0" anchor="ctr"/>
+          <a:lstStyle/>
+          <a:p>
+            <a:pPr algn="ctr"/>
+            <a:r>
+              <a:rPr lang="en-US" sz="1200" dirty="0">
+                <a:solidFill>
+                  <a:schemeClr val="tx1"/>
+                </a:solidFill>
+              </a:rPr>
+              <a:t>Instantaneous preview of results</a:t>
+            </a:r>
+          </a:p>
+        </p:txBody>
+      </p:sp>
+      <p:sp>
+        <p:nvSpPr>
+          <p:cNvPr id="10" name="Oval 9">
+            <a:extLst>
+              <a:ext uri="{FF2B5EF4-FFF2-40B4-BE49-F238E27FC236}">
+                <a16:creationId xmlns:a16="http://schemas.microsoft.com/office/drawing/2014/main" id="{642B03E5-F95B-41CF-85F2-287BA340033B}"/>
+              </a:ext>
+            </a:extLst>
+          </p:cNvPr>
+          <p:cNvSpPr/>
+          <p:nvPr/>
+        </p:nvSpPr>
+        <p:spPr>
+          <a:xfrm>
+            <a:off x="2062977" y="2268576"/>
+            <a:ext cx="261257" cy="261257"/>
+          </a:xfrm>
+          <a:prstGeom prst="ellipse">
+            <a:avLst/>
+          </a:prstGeom>
+          <a:solidFill>
+            <a:schemeClr val="bg1"/>
+          </a:solidFill>
+          <a:ln>
+            <a:solidFill>
+              <a:schemeClr val="tx1"/>
+            </a:solidFill>
+          </a:ln>
+          <a:effectLst>
+            <a:outerShdw blurRad="50800" dist="12700" dir="2700000" algn="tl" rotWithShape="0">
+              <a:prstClr val="black">
+                <a:alpha val="40000"/>
+              </a:prstClr>
+            </a:outerShdw>
+          </a:effectLst>
+        </p:spPr>
+        <p:style>
+          <a:lnRef idx="2">
+            <a:schemeClr val="accent1">
+              <a:shade val="50000"/>
+            </a:schemeClr>
+          </a:lnRef>
+          <a:fillRef idx="1">
+            <a:schemeClr val="accent1"/>
+          </a:fillRef>
+          <a:effectRef idx="0">
+            <a:schemeClr val="accent1"/>
+          </a:effectRef>
+          <a:fontRef idx="minor">
+            <a:schemeClr val="lt1"/>
+          </a:fontRef>
+        </p:style>
+        <p:txBody>
+          <a:bodyPr rtlCol="0" anchor="ctr"/>
+          <a:lstStyle/>
+          <a:p>
+            <a:pPr algn="ctr"/>
+            <a:r>
+              <a:rPr lang="en-US" sz="1200" b="1" dirty="0">
+                <a:solidFill>
+                  <a:schemeClr val="tx1"/>
+                </a:solidFill>
+              </a:rPr>
+              <a:t>1</a:t>
+            </a:r>
+          </a:p>
+        </p:txBody>
+      </p:sp>
+      <p:sp>
+        <p:nvSpPr>
+          <p:cNvPr id="11" name="Oval 10">
+            <a:extLst>
+              <a:ext uri="{FF2B5EF4-FFF2-40B4-BE49-F238E27FC236}">
+                <a16:creationId xmlns:a16="http://schemas.microsoft.com/office/drawing/2014/main" id="{1C5315F6-CB55-48F5-BD8D-1522B19C1D5F}"/>
+              </a:ext>
+            </a:extLst>
+          </p:cNvPr>
+          <p:cNvSpPr/>
+          <p:nvPr/>
+        </p:nvSpPr>
+        <p:spPr>
+          <a:xfrm>
+            <a:off x="7427756" y="2290788"/>
+            <a:ext cx="261257" cy="261257"/>
+          </a:xfrm>
+          <a:prstGeom prst="ellipse">
+            <a:avLst/>
+          </a:prstGeom>
+          <a:solidFill>
+            <a:schemeClr val="bg1"/>
+          </a:solidFill>
+          <a:ln>
+            <a:solidFill>
+              <a:schemeClr val="tx1"/>
+            </a:solidFill>
+          </a:ln>
+          <a:effectLst>
+            <a:outerShdw blurRad="50800" dist="12700" dir="2700000" algn="tl" rotWithShape="0">
+              <a:prstClr val="black">
+                <a:alpha val="40000"/>
+              </a:prstClr>
+            </a:outerShdw>
+          </a:effectLst>
+        </p:spPr>
+        <p:style>
+          <a:lnRef idx="2">
+            <a:schemeClr val="accent1">
+              <a:shade val="50000"/>
+            </a:schemeClr>
+          </a:lnRef>
+          <a:fillRef idx="1">
+            <a:schemeClr val="accent1"/>
+          </a:fillRef>
+          <a:effectRef idx="0">
+            <a:schemeClr val="accent1"/>
+          </a:effectRef>
+          <a:fontRef idx="minor">
+            <a:schemeClr val="lt1"/>
+          </a:fontRef>
+        </p:style>
+        <p:txBody>
+          <a:bodyPr rtlCol="0" anchor="ctr"/>
+          <a:lstStyle/>
+          <a:p>
+            <a:pPr algn="ctr"/>
+            <a:r>
+              <a:rPr lang="en-US" sz="1200" b="1" dirty="0">
+                <a:solidFill>
+                  <a:schemeClr val="tx1"/>
+                </a:solidFill>
+              </a:rPr>
+              <a:t>2</a:t>
+            </a:r>
+          </a:p>
+        </p:txBody>
+      </p:sp>
+      <p:sp>
+        <p:nvSpPr>
+          <p:cNvPr id="12" name="Oval 11">
+            <a:extLst>
+              <a:ext uri="{FF2B5EF4-FFF2-40B4-BE49-F238E27FC236}">
+                <a16:creationId xmlns:a16="http://schemas.microsoft.com/office/drawing/2014/main" id="{4C8368D2-4991-4146-9D66-0404203EBAB6}"/>
+              </a:ext>
+            </a:extLst>
+          </p:cNvPr>
+          <p:cNvSpPr/>
+          <p:nvPr/>
+        </p:nvSpPr>
+        <p:spPr>
+          <a:xfrm>
+            <a:off x="6261154" y="4656367"/>
+            <a:ext cx="261257" cy="261257"/>
+          </a:xfrm>
+          <a:prstGeom prst="ellipse">
+            <a:avLst/>
+          </a:prstGeom>
+          <a:solidFill>
+            <a:schemeClr val="bg1"/>
+          </a:solidFill>
+          <a:ln>
+            <a:solidFill>
+              <a:schemeClr val="tx1"/>
+            </a:solidFill>
+          </a:ln>
+          <a:effectLst>
+            <a:outerShdw blurRad="50800" dist="12700" dir="2700000" algn="tl" rotWithShape="0">
+              <a:prstClr val="black">
+                <a:alpha val="40000"/>
+              </a:prstClr>
+            </a:outerShdw>
+          </a:effectLst>
+        </p:spPr>
+        <p:style>
+          <a:lnRef idx="2">
+            <a:schemeClr val="accent1">
+              <a:shade val="50000"/>
+            </a:schemeClr>
+          </a:lnRef>
+          <a:fillRef idx="1">
+            <a:schemeClr val="accent1"/>
+          </a:fillRef>
+          <a:effectRef idx="0">
+            <a:schemeClr val="accent1"/>
+          </a:effectRef>
+          <a:fontRef idx="minor">
+            <a:schemeClr val="lt1"/>
+          </a:fontRef>
+        </p:style>
+        <p:txBody>
+          <a:bodyPr rtlCol="0" anchor="ctr"/>
+          <a:lstStyle/>
+          <a:p>
+            <a:pPr algn="ctr"/>
+            <a:r>
+              <a:rPr lang="en-US" sz="1200" b="1" dirty="0">
+                <a:solidFill>
+                  <a:schemeClr val="tx1"/>
+                </a:solidFill>
+              </a:rPr>
+              <a:t>3</a:t>
+            </a:r>
+          </a:p>
+        </p:txBody>
+      </p:sp>
+    </p:spTree>
+    <p:extLst>
+      <p:ext uri="{BB962C8B-B14F-4D97-AF65-F5344CB8AC3E}">
+        <p14:creationId xmlns:p14="http://schemas.microsoft.com/office/powerpoint/2010/main" val="2917150053"/>
+      </p:ext>
+    </p:extLst>
+  </p:cSld>
+  <p:clrMapOvr>
+    <a:masterClrMapping/>
+  </p:clrMapOvr>
+</p:sld>
+</file>
+
+<file path=ppt/slides/slide4.xml><?xml version="1.0" encoding="utf-8"?>
+<p:sld xmlns:a="http://schemas.openxmlformats.org/drawingml/2006/main" xmlns:r="http://schemas.openxmlformats.org/officeDocument/2006/relationships" xmlns:p="http://schemas.openxmlformats.org/presentationml/2006/main">
+  <p:cSld>
+    <p:spTree>
+      <p:nvGrpSpPr>
+        <p:cNvPr id="1" name=""/>
+        <p:cNvGrpSpPr/>
+        <p:nvPr/>
+      </p:nvGrpSpPr>
+      <p:grpSpPr>
+        <a:xfrm>
+          <a:off x="0" y="0"/>
+          <a:ext cx="0" cy="0"/>
+          <a:chOff x="0" y="0"/>
+          <a:chExt cx="0" cy="0"/>
+        </a:xfrm>
+      </p:grpSpPr>
       <p:sp>
         <p:nvSpPr>
           <p:cNvPr id="4" name="Parallelogram 3">
@@ -5339,7 +5813,7 @@
 </p:sld>
 </file>
 
-<file path=ppt/slides/slide4.xml><?xml version="1.0" encoding="utf-8"?>
+<file path=ppt/slides/slide5.xml><?xml version="1.0" encoding="utf-8"?>
 <p:sld xmlns:a="http://schemas.openxmlformats.org/drawingml/2006/main" xmlns:r="http://schemas.openxmlformats.org/officeDocument/2006/relationships" xmlns:p="http://schemas.openxmlformats.org/presentationml/2006/main">
   <p:cSld>
     <p:spTree>

</xml_diff>